<commit_message>
Finished my presentation slides with timing notes
</commit_message>
<xml_diff>
--- a/Documents/design review presentation/Design Presentation Hafsah.pptx
+++ b/Documents/design review presentation/Design Presentation Hafsah.pptx
@@ -9,13 +9,13 @@
   </p:notesMasterIdLst>
   <p:sldIdLst>
     <p:sldId id="260" r:id="rId2"/>
-    <p:sldId id="259" r:id="rId3"/>
-    <p:sldId id="261" r:id="rId4"/>
-    <p:sldId id="265" r:id="rId5"/>
-    <p:sldId id="262" r:id="rId6"/>
-    <p:sldId id="263" r:id="rId7"/>
-    <p:sldId id="266" r:id="rId8"/>
-    <p:sldId id="264" r:id="rId9"/>
+    <p:sldId id="267" r:id="rId3"/>
+    <p:sldId id="264" r:id="rId4"/>
+    <p:sldId id="261" r:id="rId5"/>
+    <p:sldId id="265" r:id="rId6"/>
+    <p:sldId id="262" r:id="rId7"/>
+    <p:sldId id="263" r:id="rId8"/>
+    <p:sldId id="266" r:id="rId9"/>
   </p:sldIdLst>
   <p:sldSz cx="12192000" cy="6858000"/>
   <p:notesSz cx="6858000" cy="9144000"/>
@@ -518,7 +518,7 @@
           <a:p>
             <a:r>
               <a:rPr lang="en-US" dirty="0"/>
-              <a:t>Diagram showing how to drop disks into slots. Diagram showing possible wins (ex – diagonal)</a:t>
+              <a:t>Time: 24 seconds</a:t>
             </a:r>
             <a:endParaRPr lang="en-CA" dirty="0"/>
           </a:p>
@@ -606,7 +606,7 @@
           <a:p>
             <a:r>
               <a:rPr lang="en-US" dirty="0"/>
-              <a:t>This will probably change a lot.</a:t>
+              <a:t>Time: 20 seconds</a:t>
             </a:r>
             <a:endParaRPr lang="en-CA" dirty="0"/>
           </a:p>
@@ -638,7 +638,7 @@
     </p:spTree>
     <p:extLst>
       <p:ext uri="{BB962C8B-B14F-4D97-AF65-F5344CB8AC3E}">
-        <p14:creationId xmlns:p14="http://schemas.microsoft.com/office/powerpoint/2010/main" val="4263760427"/>
+        <p14:creationId xmlns:p14="http://schemas.microsoft.com/office/powerpoint/2010/main" val="1495227379"/>
       </p:ext>
     </p:extLst>
   </p:cSld>
@@ -693,10 +693,9 @@
           <a:lstStyle/>
           <a:p>
             <a:r>
-              <a:rPr lang="en-US" dirty="0"/>
-              <a:t>Possible end view. Another possible one is “It’s a tie” or having only Thanks for playing! large</a:t>
-            </a:r>
-            <a:endParaRPr lang="en-CA" dirty="0"/>
+              <a:rPr lang="en-CA" dirty="0"/>
+              <a:t>Time: 29 seconds</a:t>
+            </a:r>
           </a:p>
         </p:txBody>
       </p:sp>
@@ -717,7 +716,7 @@
           <a:p>
             <a:fld id="{54273BDC-7817-48C8-AC9A-82012B735B31}" type="slidenum">
               <a:rPr lang="en-CA" smtClean="0"/>
-              <a:t>6</a:t>
+              <a:t>3</a:t>
             </a:fld>
             <a:endParaRPr lang="en-CA"/>
           </a:p>
@@ -726,7 +725,7 @@
     </p:spTree>
     <p:extLst>
       <p:ext uri="{BB962C8B-B14F-4D97-AF65-F5344CB8AC3E}">
-        <p14:creationId xmlns:p14="http://schemas.microsoft.com/office/powerpoint/2010/main" val="1666802472"/>
+        <p14:creationId xmlns:p14="http://schemas.microsoft.com/office/powerpoint/2010/main" val="1283731702"/>
       </p:ext>
     </p:extLst>
   </p:cSld>
@@ -781,9 +780,10 @@
           <a:lstStyle/>
           <a:p>
             <a:r>
-              <a:rPr lang="en-CA" dirty="0"/>
-              <a:t>https://www.pygame.org/docs/tut/newbieguide.html, </a:t>
-            </a:r>
+              <a:rPr lang="en-US" dirty="0"/>
+              <a:t>Time: 7 seconds</a:t>
+            </a:r>
+            <a:endParaRPr lang="en-CA" dirty="0"/>
           </a:p>
         </p:txBody>
       </p:sp>
@@ -804,7 +804,7 @@
           <a:p>
             <a:fld id="{54273BDC-7817-48C8-AC9A-82012B735B31}" type="slidenum">
               <a:rPr lang="en-CA" smtClean="0"/>
-              <a:t>8</a:t>
+              <a:t>4</a:t>
             </a:fld>
             <a:endParaRPr lang="en-CA"/>
           </a:p>
@@ -813,7 +813,359 @@
     </p:spTree>
     <p:extLst>
       <p:ext uri="{BB962C8B-B14F-4D97-AF65-F5344CB8AC3E}">
-        <p14:creationId xmlns:p14="http://schemas.microsoft.com/office/powerpoint/2010/main" val="1283731702"/>
+        <p14:creationId xmlns:p14="http://schemas.microsoft.com/office/powerpoint/2010/main" val="1369565578"/>
+      </p:ext>
+    </p:extLst>
+  </p:cSld>
+  <p:clrMapOvr>
+    <a:masterClrMapping/>
+  </p:clrMapOvr>
+</p:notes>
+</file>
+
+<file path=ppt/notesSlides/notesSlide5.xml><?xml version="1.0" encoding="utf-8"?>
+<p:notes xmlns:a="http://schemas.openxmlformats.org/drawingml/2006/main" xmlns:r="http://schemas.openxmlformats.org/officeDocument/2006/relationships" xmlns:p="http://schemas.openxmlformats.org/presentationml/2006/main">
+  <p:cSld>
+    <p:spTree>
+      <p:nvGrpSpPr>
+        <p:cNvPr id="1" name=""/>
+        <p:cNvGrpSpPr/>
+        <p:nvPr/>
+      </p:nvGrpSpPr>
+      <p:grpSpPr>
+        <a:xfrm>
+          <a:off x="0" y="0"/>
+          <a:ext cx="0" cy="0"/>
+          <a:chOff x="0" y="0"/>
+          <a:chExt cx="0" cy="0"/>
+        </a:xfrm>
+      </p:grpSpPr>
+      <p:sp>
+        <p:nvSpPr>
+          <p:cNvPr id="2" name="Slide Image Placeholder 1"/>
+          <p:cNvSpPr>
+            <a:spLocks noGrp="1" noRot="1" noChangeAspect="1"/>
+          </p:cNvSpPr>
+          <p:nvPr>
+            <p:ph type="sldImg"/>
+          </p:nvPr>
+        </p:nvSpPr>
+        <p:spPr/>
+      </p:sp>
+      <p:sp>
+        <p:nvSpPr>
+          <p:cNvPr id="3" name="Notes Placeholder 2"/>
+          <p:cNvSpPr>
+            <a:spLocks noGrp="1"/>
+          </p:cNvSpPr>
+          <p:nvPr>
+            <p:ph type="body" idx="1"/>
+          </p:nvPr>
+        </p:nvSpPr>
+        <p:spPr/>
+        <p:txBody>
+          <a:bodyPr/>
+          <a:lstStyle/>
+          <a:p>
+            <a:r>
+              <a:rPr lang="en-US" dirty="0"/>
+              <a:t>Time: 5 seconds</a:t>
+            </a:r>
+            <a:endParaRPr lang="en-CA" dirty="0"/>
+          </a:p>
+        </p:txBody>
+      </p:sp>
+      <p:sp>
+        <p:nvSpPr>
+          <p:cNvPr id="4" name="Slide Number Placeholder 3"/>
+          <p:cNvSpPr>
+            <a:spLocks noGrp="1"/>
+          </p:cNvSpPr>
+          <p:nvPr>
+            <p:ph type="sldNum" sz="quarter" idx="5"/>
+          </p:nvPr>
+        </p:nvSpPr>
+        <p:spPr/>
+        <p:txBody>
+          <a:bodyPr/>
+          <a:lstStyle/>
+          <a:p>
+            <a:fld id="{54273BDC-7817-48C8-AC9A-82012B735B31}" type="slidenum">
+              <a:rPr lang="en-CA" smtClean="0"/>
+              <a:t>5</a:t>
+            </a:fld>
+            <a:endParaRPr lang="en-CA"/>
+          </a:p>
+        </p:txBody>
+      </p:sp>
+    </p:spTree>
+    <p:extLst>
+      <p:ext uri="{BB962C8B-B14F-4D97-AF65-F5344CB8AC3E}">
+        <p14:creationId xmlns:p14="http://schemas.microsoft.com/office/powerpoint/2010/main" val="2863046"/>
+      </p:ext>
+    </p:extLst>
+  </p:cSld>
+  <p:clrMapOvr>
+    <a:masterClrMapping/>
+  </p:clrMapOvr>
+</p:notes>
+</file>
+
+<file path=ppt/notesSlides/notesSlide6.xml><?xml version="1.0" encoding="utf-8"?>
+<p:notes xmlns:a="http://schemas.openxmlformats.org/drawingml/2006/main" xmlns:r="http://schemas.openxmlformats.org/officeDocument/2006/relationships" xmlns:p="http://schemas.openxmlformats.org/presentationml/2006/main">
+  <p:cSld>
+    <p:spTree>
+      <p:nvGrpSpPr>
+        <p:cNvPr id="1" name=""/>
+        <p:cNvGrpSpPr/>
+        <p:nvPr/>
+      </p:nvGrpSpPr>
+      <p:grpSpPr>
+        <a:xfrm>
+          <a:off x="0" y="0"/>
+          <a:ext cx="0" cy="0"/>
+          <a:chOff x="0" y="0"/>
+          <a:chExt cx="0" cy="0"/>
+        </a:xfrm>
+      </p:grpSpPr>
+      <p:sp>
+        <p:nvSpPr>
+          <p:cNvPr id="2" name="Slide Image Placeholder 1"/>
+          <p:cNvSpPr>
+            <a:spLocks noGrp="1" noRot="1" noChangeAspect="1"/>
+          </p:cNvSpPr>
+          <p:nvPr>
+            <p:ph type="sldImg"/>
+          </p:nvPr>
+        </p:nvSpPr>
+        <p:spPr/>
+      </p:sp>
+      <p:sp>
+        <p:nvSpPr>
+          <p:cNvPr id="3" name="Notes Placeholder 2"/>
+          <p:cNvSpPr>
+            <a:spLocks noGrp="1"/>
+          </p:cNvSpPr>
+          <p:nvPr>
+            <p:ph type="body" idx="1"/>
+          </p:nvPr>
+        </p:nvSpPr>
+        <p:spPr/>
+        <p:txBody>
+          <a:bodyPr/>
+          <a:lstStyle/>
+          <a:p>
+            <a:r>
+              <a:rPr lang="en-US" dirty="0"/>
+              <a:t>Time: 3 seconds</a:t>
+            </a:r>
+            <a:endParaRPr lang="en-CA" dirty="0"/>
+          </a:p>
+        </p:txBody>
+      </p:sp>
+      <p:sp>
+        <p:nvSpPr>
+          <p:cNvPr id="4" name="Slide Number Placeholder 3"/>
+          <p:cNvSpPr>
+            <a:spLocks noGrp="1"/>
+          </p:cNvSpPr>
+          <p:nvPr>
+            <p:ph type="sldNum" sz="quarter" idx="5"/>
+          </p:nvPr>
+        </p:nvSpPr>
+        <p:spPr/>
+        <p:txBody>
+          <a:bodyPr/>
+          <a:lstStyle/>
+          <a:p>
+            <a:fld id="{54273BDC-7817-48C8-AC9A-82012B735B31}" type="slidenum">
+              <a:rPr lang="en-CA" smtClean="0"/>
+              <a:t>6</a:t>
+            </a:fld>
+            <a:endParaRPr lang="en-CA"/>
+          </a:p>
+        </p:txBody>
+      </p:sp>
+    </p:spTree>
+    <p:extLst>
+      <p:ext uri="{BB962C8B-B14F-4D97-AF65-F5344CB8AC3E}">
+        <p14:creationId xmlns:p14="http://schemas.microsoft.com/office/powerpoint/2010/main" val="2940359391"/>
+      </p:ext>
+    </p:extLst>
+  </p:cSld>
+  <p:clrMapOvr>
+    <a:masterClrMapping/>
+  </p:clrMapOvr>
+</p:notes>
+</file>
+
+<file path=ppt/notesSlides/notesSlide7.xml><?xml version="1.0" encoding="utf-8"?>
+<p:notes xmlns:a="http://schemas.openxmlformats.org/drawingml/2006/main" xmlns:r="http://schemas.openxmlformats.org/officeDocument/2006/relationships" xmlns:p="http://schemas.openxmlformats.org/presentationml/2006/main">
+  <p:cSld>
+    <p:spTree>
+      <p:nvGrpSpPr>
+        <p:cNvPr id="1" name=""/>
+        <p:cNvGrpSpPr/>
+        <p:nvPr/>
+      </p:nvGrpSpPr>
+      <p:grpSpPr>
+        <a:xfrm>
+          <a:off x="0" y="0"/>
+          <a:ext cx="0" cy="0"/>
+          <a:chOff x="0" y="0"/>
+          <a:chExt cx="0" cy="0"/>
+        </a:xfrm>
+      </p:grpSpPr>
+      <p:sp>
+        <p:nvSpPr>
+          <p:cNvPr id="2" name="Slide Image Placeholder 1"/>
+          <p:cNvSpPr>
+            <a:spLocks noGrp="1" noRot="1" noChangeAspect="1"/>
+          </p:cNvSpPr>
+          <p:nvPr>
+            <p:ph type="sldImg"/>
+          </p:nvPr>
+        </p:nvSpPr>
+        <p:spPr/>
+      </p:sp>
+      <p:sp>
+        <p:nvSpPr>
+          <p:cNvPr id="3" name="Notes Placeholder 2"/>
+          <p:cNvSpPr>
+            <a:spLocks noGrp="1"/>
+          </p:cNvSpPr>
+          <p:nvPr>
+            <p:ph type="body" idx="1"/>
+          </p:nvPr>
+        </p:nvSpPr>
+        <p:spPr/>
+        <p:txBody>
+          <a:bodyPr/>
+          <a:lstStyle/>
+          <a:p>
+            <a:r>
+              <a:rPr lang="en-US" dirty="0"/>
+              <a:t>Time: 3 seconds</a:t>
+            </a:r>
+            <a:endParaRPr lang="en-CA" dirty="0"/>
+          </a:p>
+        </p:txBody>
+      </p:sp>
+      <p:sp>
+        <p:nvSpPr>
+          <p:cNvPr id="4" name="Slide Number Placeholder 3"/>
+          <p:cNvSpPr>
+            <a:spLocks noGrp="1"/>
+          </p:cNvSpPr>
+          <p:nvPr>
+            <p:ph type="sldNum" sz="quarter" idx="5"/>
+          </p:nvPr>
+        </p:nvSpPr>
+        <p:spPr/>
+        <p:txBody>
+          <a:bodyPr/>
+          <a:lstStyle/>
+          <a:p>
+            <a:fld id="{54273BDC-7817-48C8-AC9A-82012B735B31}" type="slidenum">
+              <a:rPr lang="en-CA" smtClean="0"/>
+              <a:t>7</a:t>
+            </a:fld>
+            <a:endParaRPr lang="en-CA"/>
+          </a:p>
+        </p:txBody>
+      </p:sp>
+    </p:spTree>
+    <p:extLst>
+      <p:ext uri="{BB962C8B-B14F-4D97-AF65-F5344CB8AC3E}">
+        <p14:creationId xmlns:p14="http://schemas.microsoft.com/office/powerpoint/2010/main" val="1666802472"/>
+      </p:ext>
+    </p:extLst>
+  </p:cSld>
+  <p:clrMapOvr>
+    <a:masterClrMapping/>
+  </p:clrMapOvr>
+</p:notes>
+</file>
+
+<file path=ppt/notesSlides/notesSlide8.xml><?xml version="1.0" encoding="utf-8"?>
+<p:notes xmlns:a="http://schemas.openxmlformats.org/drawingml/2006/main" xmlns:r="http://schemas.openxmlformats.org/officeDocument/2006/relationships" xmlns:p="http://schemas.openxmlformats.org/presentationml/2006/main">
+  <p:cSld>
+    <p:spTree>
+      <p:nvGrpSpPr>
+        <p:cNvPr id="1" name=""/>
+        <p:cNvGrpSpPr/>
+        <p:nvPr/>
+      </p:nvGrpSpPr>
+      <p:grpSpPr>
+        <a:xfrm>
+          <a:off x="0" y="0"/>
+          <a:ext cx="0" cy="0"/>
+          <a:chOff x="0" y="0"/>
+          <a:chExt cx="0" cy="0"/>
+        </a:xfrm>
+      </p:grpSpPr>
+      <p:sp>
+        <p:nvSpPr>
+          <p:cNvPr id="2" name="Slide Image Placeholder 1"/>
+          <p:cNvSpPr>
+            <a:spLocks noGrp="1" noRot="1" noChangeAspect="1"/>
+          </p:cNvSpPr>
+          <p:nvPr>
+            <p:ph type="sldImg"/>
+          </p:nvPr>
+        </p:nvSpPr>
+        <p:spPr/>
+      </p:sp>
+      <p:sp>
+        <p:nvSpPr>
+          <p:cNvPr id="3" name="Notes Placeholder 2"/>
+          <p:cNvSpPr>
+            <a:spLocks noGrp="1"/>
+          </p:cNvSpPr>
+          <p:nvPr>
+            <p:ph type="body" idx="1"/>
+          </p:nvPr>
+        </p:nvSpPr>
+        <p:spPr/>
+        <p:txBody>
+          <a:bodyPr/>
+          <a:lstStyle/>
+          <a:p>
+            <a:r>
+              <a:rPr lang="en-US" dirty="0"/>
+              <a:t>Time: 7 seconds</a:t>
+            </a:r>
+            <a:endParaRPr lang="en-CA" dirty="0"/>
+          </a:p>
+        </p:txBody>
+      </p:sp>
+      <p:sp>
+        <p:nvSpPr>
+          <p:cNvPr id="4" name="Slide Number Placeholder 3"/>
+          <p:cNvSpPr>
+            <a:spLocks noGrp="1"/>
+          </p:cNvSpPr>
+          <p:nvPr>
+            <p:ph type="sldNum" sz="quarter" idx="5"/>
+          </p:nvPr>
+        </p:nvSpPr>
+        <p:spPr/>
+        <p:txBody>
+          <a:bodyPr/>
+          <a:lstStyle/>
+          <a:p>
+            <a:fld id="{54273BDC-7817-48C8-AC9A-82012B735B31}" type="slidenum">
+              <a:rPr lang="en-CA" smtClean="0"/>
+              <a:t>8</a:t>
+            </a:fld>
+            <a:endParaRPr lang="en-CA"/>
+          </a:p>
+        </p:txBody>
+      </p:sp>
+    </p:spTree>
+    <p:extLst>
+      <p:ext uri="{BB962C8B-B14F-4D97-AF65-F5344CB8AC3E}">
+        <p14:creationId xmlns:p14="http://schemas.microsoft.com/office/powerpoint/2010/main" val="2522853599"/>
       </p:ext>
     </p:extLst>
   </p:cSld>
@@ -4110,7 +4462,9 @@
           </a:xfrm>
         </p:spPr>
         <p:txBody>
-          <a:bodyPr/>
+          <a:bodyPr>
+            <a:normAutofit lnSpcReduction="10000"/>
+          </a:bodyPr>
           <a:lstStyle/>
           <a:p>
             <a:r>
@@ -4136,23 +4490,14 @@
             <a:pPr lvl="1"/>
             <a:r>
               <a:rPr lang="en-US" dirty="0"/>
-              <a:t>Once 4 disks of one </a:t>
-            </a:r>
-            <a:r>
-              <a:rPr lang="en-US" dirty="0" err="1"/>
-              <a:t>colour</a:t>
-            </a:r>
+              <a:t>First player to make a move plays with red disks and the second with yellow.</a:t>
+            </a:r>
+          </a:p>
+          <a:p>
+            <a:pPr lvl="1"/>
             <a:r>
               <a:rPr lang="en-US" dirty="0"/>
-              <a:t> are placed in a sequence either horizontally, vertically or diagonally, the player with that </a:t>
-            </a:r>
-            <a:r>
-              <a:rPr lang="en-US" dirty="0" err="1"/>
-              <a:t>colour</a:t>
-            </a:r>
-            <a:r>
-              <a:rPr lang="en-US" dirty="0"/>
-              <a:t> wins.</a:t>
+              <a:t>Once player 1 or 2 claims victory by having 4 disks connected, no more moves can be made.</a:t>
             </a:r>
           </a:p>
           <a:p>
@@ -4165,6 +4510,13 @@
             <a:pPr lvl="1"/>
             <a:r>
               <a:rPr lang="en-US" dirty="0"/>
+              <a:t>Disks are dropped into the last empty slot of the column.</a:t>
+            </a:r>
+          </a:p>
+          <a:p>
+            <a:pPr lvl="1"/>
+            <a:r>
+              <a:rPr lang="en-US" dirty="0"/>
               <a:t>Players cannot drop a disk in a column that is filled.</a:t>
             </a:r>
           </a:p>
@@ -4172,7 +4524,7 @@
             <a:pPr lvl="1"/>
             <a:r>
               <a:rPr lang="en-US" dirty="0"/>
-              <a:t>Once all slots are filled, no more moves can be made. The game is finished and no player wins.</a:t>
+              <a:t>Once all 42 slots are filled, no more moves can be made. The game is finished and no player wins.</a:t>
             </a:r>
             <a:endParaRPr lang="en-CA" dirty="0"/>
           </a:p>
@@ -4213,7 +4565,2530 @@
           <p:cNvPr id="2" name="Title 1">
             <a:extLst>
               <a:ext uri="{FF2B5EF4-FFF2-40B4-BE49-F238E27FC236}">
-                <a16:creationId xmlns:a16="http://schemas.microsoft.com/office/drawing/2014/main" id="{D04C7AF2-4276-4FDC-B1A2-291469AD9CC5}"/>
+                <a16:creationId xmlns:a16="http://schemas.microsoft.com/office/drawing/2014/main" id="{4DD40DA6-E1E1-48D5-B131-41F8E290B71E}"/>
+              </a:ext>
+            </a:extLst>
+          </p:cNvPr>
+          <p:cNvSpPr>
+            <a:spLocks noGrp="1"/>
+          </p:cNvSpPr>
+          <p:nvPr>
+            <p:ph type="title"/>
+          </p:nvPr>
+        </p:nvSpPr>
+        <p:spPr>
+          <a:xfrm>
+            <a:off x="838200" y="346335"/>
+            <a:ext cx="10515600" cy="1325563"/>
+          </a:xfrm>
+        </p:spPr>
+        <p:txBody>
+          <a:bodyPr/>
+          <a:lstStyle/>
+          <a:p>
+            <a:r>
+              <a:rPr lang="en-US" dirty="0"/>
+              <a:t>Input and Output Devices</a:t>
+            </a:r>
+            <a:endParaRPr lang="en-CA" dirty="0"/>
+          </a:p>
+        </p:txBody>
+      </p:sp>
+      <p:sp>
+        <p:nvSpPr>
+          <p:cNvPr id="3" name="Content Placeholder 2">
+            <a:extLst>
+              <a:ext uri="{FF2B5EF4-FFF2-40B4-BE49-F238E27FC236}">
+                <a16:creationId xmlns:a16="http://schemas.microsoft.com/office/drawing/2014/main" id="{763F3084-A7EA-4C4B-B745-F45E6DC79A4E}"/>
+              </a:ext>
+            </a:extLst>
+          </p:cNvPr>
+          <p:cNvSpPr>
+            <a:spLocks noGrp="1"/>
+          </p:cNvSpPr>
+          <p:nvPr>
+            <p:ph idx="1"/>
+          </p:nvPr>
+        </p:nvSpPr>
+        <p:spPr/>
+        <p:txBody>
+          <a:bodyPr/>
+          <a:lstStyle/>
+          <a:p>
+            <a:r>
+              <a:rPr lang="en-US" dirty="0"/>
+              <a:t>Computer Mouse</a:t>
+            </a:r>
+          </a:p>
+          <a:p>
+            <a:pPr lvl="1"/>
+            <a:r>
+              <a:rPr lang="en-US" dirty="0"/>
+              <a:t>User can click above a column to make a move</a:t>
+            </a:r>
+          </a:p>
+          <a:p>
+            <a:pPr lvl="1"/>
+            <a:r>
+              <a:rPr lang="en-US" dirty="0"/>
+              <a:t>User can press several different buttons that show them different views</a:t>
+            </a:r>
+          </a:p>
+          <a:p>
+            <a:r>
+              <a:rPr lang="en-US" dirty="0"/>
+              <a:t>Computer Monitor</a:t>
+            </a:r>
+          </a:p>
+          <a:p>
+            <a:pPr lvl="1"/>
+            <a:r>
+              <a:rPr lang="en-US" dirty="0"/>
+              <a:t>Screen</a:t>
+            </a:r>
+          </a:p>
+          <a:p>
+            <a:pPr lvl="2"/>
+            <a:r>
+              <a:rPr lang="en-US" dirty="0"/>
+              <a:t>Start View</a:t>
+            </a:r>
+          </a:p>
+          <a:p>
+            <a:pPr lvl="2"/>
+            <a:r>
+              <a:rPr lang="en-US" dirty="0"/>
+              <a:t>Help View</a:t>
+            </a:r>
+          </a:p>
+          <a:p>
+            <a:pPr lvl="2"/>
+            <a:r>
+              <a:rPr lang="en-US" dirty="0"/>
+              <a:t>Play View</a:t>
+            </a:r>
+          </a:p>
+          <a:p>
+            <a:pPr lvl="2"/>
+            <a:r>
+              <a:rPr lang="en-US" dirty="0"/>
+              <a:t>End View</a:t>
+            </a:r>
+          </a:p>
+          <a:p>
+            <a:pPr lvl="1"/>
+            <a:endParaRPr lang="en-US" dirty="0"/>
+          </a:p>
+          <a:p>
+            <a:pPr lvl="1"/>
+            <a:endParaRPr lang="en-US" dirty="0"/>
+          </a:p>
+        </p:txBody>
+      </p:sp>
+      <p:grpSp>
+        <p:nvGrpSpPr>
+          <p:cNvPr id="54" name="Group 53">
+            <a:extLst>
+              <a:ext uri="{FF2B5EF4-FFF2-40B4-BE49-F238E27FC236}">
+                <a16:creationId xmlns:a16="http://schemas.microsoft.com/office/drawing/2014/main" id="{3DFF3D6B-F320-4BDE-905F-ECB102E7B732}"/>
+              </a:ext>
+            </a:extLst>
+          </p:cNvPr>
+          <p:cNvGrpSpPr/>
+          <p:nvPr/>
+        </p:nvGrpSpPr>
+        <p:grpSpPr>
+          <a:xfrm>
+            <a:off x="6096000" y="3270344"/>
+            <a:ext cx="3297974" cy="2906619"/>
+            <a:chOff x="5379926" y="1189392"/>
+            <a:chExt cx="4494569" cy="3961220"/>
+          </a:xfrm>
+        </p:grpSpPr>
+        <p:grpSp>
+          <p:nvGrpSpPr>
+            <p:cNvPr id="55" name="Group 54">
+              <a:extLst>
+                <a:ext uri="{FF2B5EF4-FFF2-40B4-BE49-F238E27FC236}">
+                  <a16:creationId xmlns:a16="http://schemas.microsoft.com/office/drawing/2014/main" id="{5AF0A4D1-D8A1-48AD-B603-F84713F5D114}"/>
+                </a:ext>
+              </a:extLst>
+            </p:cNvPr>
+            <p:cNvGrpSpPr/>
+            <p:nvPr/>
+          </p:nvGrpSpPr>
+          <p:grpSpPr>
+            <a:xfrm>
+              <a:off x="5379926" y="1707388"/>
+              <a:ext cx="4494569" cy="3443224"/>
+              <a:chOff x="3319394" y="2383075"/>
+              <a:chExt cx="4672211" cy="3579313"/>
+            </a:xfrm>
+          </p:grpSpPr>
+          <p:sp>
+            <p:nvSpPr>
+              <p:cNvPr id="58" name="Rectangle: Rounded Corners 57">
+                <a:extLst>
+                  <a:ext uri="{FF2B5EF4-FFF2-40B4-BE49-F238E27FC236}">
+                    <a16:creationId xmlns:a16="http://schemas.microsoft.com/office/drawing/2014/main" id="{2D963159-9698-4E6A-A47F-1AE2DB4C9CF7}"/>
+                  </a:ext>
+                </a:extLst>
+              </p:cNvPr>
+              <p:cNvSpPr/>
+              <p:nvPr/>
+            </p:nvSpPr>
+            <p:spPr>
+              <a:xfrm>
+                <a:off x="3319394" y="2383075"/>
+                <a:ext cx="4672211" cy="3579313"/>
+              </a:xfrm>
+              <a:prstGeom prst="roundRect">
+                <a:avLst/>
+              </a:prstGeom>
+            </p:spPr>
+            <p:style>
+              <a:lnRef idx="2">
+                <a:schemeClr val="accent1">
+                  <a:shade val="50000"/>
+                </a:schemeClr>
+              </a:lnRef>
+              <a:fillRef idx="1">
+                <a:schemeClr val="accent1"/>
+              </a:fillRef>
+              <a:effectRef idx="0">
+                <a:schemeClr val="accent1"/>
+              </a:effectRef>
+              <a:fontRef idx="minor">
+                <a:schemeClr val="lt1"/>
+              </a:fontRef>
+            </p:style>
+            <p:txBody>
+              <a:bodyPr rtlCol="0" anchor="ctr"/>
+              <a:lstStyle/>
+              <a:p>
+                <a:pPr algn="ctr"/>
+                <a:endParaRPr lang="en-CA"/>
+              </a:p>
+            </p:txBody>
+          </p:sp>
+          <p:grpSp>
+            <p:nvGrpSpPr>
+              <p:cNvPr id="59" name="Group 58">
+                <a:extLst>
+                  <a:ext uri="{FF2B5EF4-FFF2-40B4-BE49-F238E27FC236}">
+                    <a16:creationId xmlns:a16="http://schemas.microsoft.com/office/drawing/2014/main" id="{83DC709E-727D-4588-BC85-3CB28BEE383C}"/>
+                  </a:ext>
+                </a:extLst>
+              </p:cNvPr>
+              <p:cNvGrpSpPr/>
+              <p:nvPr/>
+            </p:nvGrpSpPr>
+            <p:grpSpPr>
+              <a:xfrm>
+                <a:off x="3555825" y="2482812"/>
+                <a:ext cx="4175515" cy="458608"/>
+                <a:chOff x="3555825" y="2482812"/>
+                <a:chExt cx="4175515" cy="458608"/>
+              </a:xfrm>
+            </p:grpSpPr>
+            <p:sp>
+              <p:nvSpPr>
+                <p:cNvPr id="100" name="Oval 99">
+                  <a:extLst>
+                    <a:ext uri="{FF2B5EF4-FFF2-40B4-BE49-F238E27FC236}">
+                      <a16:creationId xmlns:a16="http://schemas.microsoft.com/office/drawing/2014/main" id="{DB736FCC-BE01-4D61-B947-F717EAD9C0F6}"/>
+                    </a:ext>
+                  </a:extLst>
+                </p:cNvPr>
+                <p:cNvSpPr/>
+                <p:nvPr/>
+              </p:nvSpPr>
+              <p:spPr>
+                <a:xfrm>
+                  <a:off x="3555825" y="2484619"/>
+                  <a:ext cx="450937" cy="450937"/>
+                </a:xfrm>
+                <a:prstGeom prst="ellipse">
+                  <a:avLst/>
+                </a:prstGeom>
+                <a:solidFill>
+                  <a:schemeClr val="bg1"/>
+                </a:solidFill>
+              </p:spPr>
+              <p:style>
+                <a:lnRef idx="2">
+                  <a:schemeClr val="accent1">
+                    <a:shade val="50000"/>
+                  </a:schemeClr>
+                </a:lnRef>
+                <a:fillRef idx="1">
+                  <a:schemeClr val="accent1"/>
+                </a:fillRef>
+                <a:effectRef idx="0">
+                  <a:schemeClr val="accent1"/>
+                </a:effectRef>
+                <a:fontRef idx="minor">
+                  <a:schemeClr val="lt1"/>
+                </a:fontRef>
+              </p:style>
+              <p:txBody>
+                <a:bodyPr rtlCol="0" anchor="ctr"/>
+                <a:lstStyle/>
+                <a:p>
+                  <a:pPr algn="ctr"/>
+                  <a:endParaRPr lang="en-CA" dirty="0"/>
+                </a:p>
+              </p:txBody>
+            </p:sp>
+            <p:sp>
+              <p:nvSpPr>
+                <p:cNvPr id="101" name="Oval 100">
+                  <a:extLst>
+                    <a:ext uri="{FF2B5EF4-FFF2-40B4-BE49-F238E27FC236}">
+                      <a16:creationId xmlns:a16="http://schemas.microsoft.com/office/drawing/2014/main" id="{C74D5BC4-7188-4184-B9A5-2239398C272D}"/>
+                    </a:ext>
+                  </a:extLst>
+                </p:cNvPr>
+                <p:cNvSpPr/>
+                <p:nvPr/>
+              </p:nvSpPr>
+              <p:spPr>
+                <a:xfrm>
+                  <a:off x="4167862" y="2484615"/>
+                  <a:ext cx="450937" cy="450937"/>
+                </a:xfrm>
+                <a:prstGeom prst="ellipse">
+                  <a:avLst/>
+                </a:prstGeom>
+                <a:solidFill>
+                  <a:schemeClr val="bg1"/>
+                </a:solidFill>
+              </p:spPr>
+              <p:style>
+                <a:lnRef idx="2">
+                  <a:schemeClr val="accent1">
+                    <a:shade val="50000"/>
+                  </a:schemeClr>
+                </a:lnRef>
+                <a:fillRef idx="1">
+                  <a:schemeClr val="accent1"/>
+                </a:fillRef>
+                <a:effectRef idx="0">
+                  <a:schemeClr val="accent1"/>
+                </a:effectRef>
+                <a:fontRef idx="minor">
+                  <a:schemeClr val="lt1"/>
+                </a:fontRef>
+              </p:style>
+              <p:txBody>
+                <a:bodyPr rtlCol="0" anchor="ctr"/>
+                <a:lstStyle/>
+                <a:p>
+                  <a:pPr algn="ctr"/>
+                  <a:endParaRPr lang="en-CA" dirty="0"/>
+                </a:p>
+              </p:txBody>
+            </p:sp>
+            <p:sp>
+              <p:nvSpPr>
+                <p:cNvPr id="102" name="Oval 101">
+                  <a:extLst>
+                    <a:ext uri="{FF2B5EF4-FFF2-40B4-BE49-F238E27FC236}">
+                      <a16:creationId xmlns:a16="http://schemas.microsoft.com/office/drawing/2014/main" id="{B5B017F5-004A-4FE1-BFD1-1CF25856ECF1}"/>
+                    </a:ext>
+                  </a:extLst>
+                </p:cNvPr>
+                <p:cNvSpPr/>
+                <p:nvPr/>
+              </p:nvSpPr>
+              <p:spPr>
+                <a:xfrm>
+                  <a:off x="4798013" y="2484615"/>
+                  <a:ext cx="450937" cy="450937"/>
+                </a:xfrm>
+                <a:prstGeom prst="ellipse">
+                  <a:avLst/>
+                </a:prstGeom>
+                <a:solidFill>
+                  <a:schemeClr val="bg1"/>
+                </a:solidFill>
+              </p:spPr>
+              <p:style>
+                <a:lnRef idx="2">
+                  <a:schemeClr val="accent1">
+                    <a:shade val="50000"/>
+                  </a:schemeClr>
+                </a:lnRef>
+                <a:fillRef idx="1">
+                  <a:schemeClr val="accent1"/>
+                </a:fillRef>
+                <a:effectRef idx="0">
+                  <a:schemeClr val="accent1"/>
+                </a:effectRef>
+                <a:fontRef idx="minor">
+                  <a:schemeClr val="lt1"/>
+                </a:fontRef>
+              </p:style>
+              <p:txBody>
+                <a:bodyPr rtlCol="0" anchor="ctr"/>
+                <a:lstStyle/>
+                <a:p>
+                  <a:pPr algn="ctr"/>
+                  <a:endParaRPr lang="en-CA" dirty="0"/>
+                </a:p>
+              </p:txBody>
+            </p:sp>
+            <p:sp>
+              <p:nvSpPr>
+                <p:cNvPr id="103" name="Oval 102">
+                  <a:extLst>
+                    <a:ext uri="{FF2B5EF4-FFF2-40B4-BE49-F238E27FC236}">
+                      <a16:creationId xmlns:a16="http://schemas.microsoft.com/office/drawing/2014/main" id="{7AEC5441-C662-4BB7-B816-6F50D10FA80D}"/>
+                    </a:ext>
+                  </a:extLst>
+                </p:cNvPr>
+                <p:cNvSpPr/>
+                <p:nvPr/>
+              </p:nvSpPr>
+              <p:spPr>
+                <a:xfrm>
+                  <a:off x="5377144" y="2484616"/>
+                  <a:ext cx="450937" cy="450937"/>
+                </a:xfrm>
+                <a:prstGeom prst="ellipse">
+                  <a:avLst/>
+                </a:prstGeom>
+                <a:solidFill>
+                  <a:schemeClr val="bg1"/>
+                </a:solidFill>
+              </p:spPr>
+              <p:style>
+                <a:lnRef idx="2">
+                  <a:schemeClr val="accent1">
+                    <a:shade val="50000"/>
+                  </a:schemeClr>
+                </a:lnRef>
+                <a:fillRef idx="1">
+                  <a:schemeClr val="accent1"/>
+                </a:fillRef>
+                <a:effectRef idx="0">
+                  <a:schemeClr val="accent1"/>
+                </a:effectRef>
+                <a:fontRef idx="minor">
+                  <a:schemeClr val="lt1"/>
+                </a:fontRef>
+              </p:style>
+              <p:txBody>
+                <a:bodyPr rtlCol="0" anchor="ctr"/>
+                <a:lstStyle/>
+                <a:p>
+                  <a:pPr algn="ctr"/>
+                  <a:endParaRPr lang="en-CA" dirty="0"/>
+                </a:p>
+              </p:txBody>
+            </p:sp>
+            <p:sp>
+              <p:nvSpPr>
+                <p:cNvPr id="104" name="Oval 103">
+                  <a:extLst>
+                    <a:ext uri="{FF2B5EF4-FFF2-40B4-BE49-F238E27FC236}">
+                      <a16:creationId xmlns:a16="http://schemas.microsoft.com/office/drawing/2014/main" id="{D8C569FE-BC87-4C9F-8D40-F7A0D7C0ED07}"/>
+                    </a:ext>
+                  </a:extLst>
+                </p:cNvPr>
+                <p:cNvSpPr/>
+                <p:nvPr/>
+              </p:nvSpPr>
+              <p:spPr>
+                <a:xfrm>
+                  <a:off x="6007295" y="2484614"/>
+                  <a:ext cx="450937" cy="450937"/>
+                </a:xfrm>
+                <a:prstGeom prst="ellipse">
+                  <a:avLst/>
+                </a:prstGeom>
+                <a:solidFill>
+                  <a:schemeClr val="bg1"/>
+                </a:solidFill>
+              </p:spPr>
+              <p:style>
+                <a:lnRef idx="2">
+                  <a:schemeClr val="accent1">
+                    <a:shade val="50000"/>
+                  </a:schemeClr>
+                </a:lnRef>
+                <a:fillRef idx="1">
+                  <a:schemeClr val="accent1"/>
+                </a:fillRef>
+                <a:effectRef idx="0">
+                  <a:schemeClr val="accent1"/>
+                </a:effectRef>
+                <a:fontRef idx="minor">
+                  <a:schemeClr val="lt1"/>
+                </a:fontRef>
+              </p:style>
+              <p:txBody>
+                <a:bodyPr rtlCol="0" anchor="ctr"/>
+                <a:lstStyle/>
+                <a:p>
+                  <a:pPr algn="ctr"/>
+                  <a:endParaRPr lang="en-CA" dirty="0"/>
+                </a:p>
+              </p:txBody>
+            </p:sp>
+            <p:sp>
+              <p:nvSpPr>
+                <p:cNvPr id="105" name="Oval 104">
+                  <a:extLst>
+                    <a:ext uri="{FF2B5EF4-FFF2-40B4-BE49-F238E27FC236}">
+                      <a16:creationId xmlns:a16="http://schemas.microsoft.com/office/drawing/2014/main" id="{733CE00C-56EB-4B01-84EF-BE4FFDEE416E}"/>
+                    </a:ext>
+                  </a:extLst>
+                </p:cNvPr>
+                <p:cNvSpPr/>
+                <p:nvPr/>
+              </p:nvSpPr>
+              <p:spPr>
+                <a:xfrm>
+                  <a:off x="6668366" y="2482812"/>
+                  <a:ext cx="450937" cy="450937"/>
+                </a:xfrm>
+                <a:prstGeom prst="ellipse">
+                  <a:avLst/>
+                </a:prstGeom>
+                <a:solidFill>
+                  <a:schemeClr val="bg1"/>
+                </a:solidFill>
+              </p:spPr>
+              <p:style>
+                <a:lnRef idx="2">
+                  <a:schemeClr val="accent1">
+                    <a:shade val="50000"/>
+                  </a:schemeClr>
+                </a:lnRef>
+                <a:fillRef idx="1">
+                  <a:schemeClr val="accent1"/>
+                </a:fillRef>
+                <a:effectRef idx="0">
+                  <a:schemeClr val="accent1"/>
+                </a:effectRef>
+                <a:fontRef idx="minor">
+                  <a:schemeClr val="lt1"/>
+                </a:fontRef>
+              </p:style>
+              <p:txBody>
+                <a:bodyPr rtlCol="0" anchor="ctr"/>
+                <a:lstStyle/>
+                <a:p>
+                  <a:pPr algn="ctr"/>
+                  <a:endParaRPr lang="en-CA" dirty="0"/>
+                </a:p>
+              </p:txBody>
+            </p:sp>
+            <p:sp>
+              <p:nvSpPr>
+                <p:cNvPr id="106" name="Oval 105">
+                  <a:extLst>
+                    <a:ext uri="{FF2B5EF4-FFF2-40B4-BE49-F238E27FC236}">
+                      <a16:creationId xmlns:a16="http://schemas.microsoft.com/office/drawing/2014/main" id="{D464CCED-8DE0-4DC3-BC97-09E2E78F29BA}"/>
+                    </a:ext>
+                  </a:extLst>
+                </p:cNvPr>
+                <p:cNvSpPr/>
+                <p:nvPr/>
+              </p:nvSpPr>
+              <p:spPr>
+                <a:xfrm>
+                  <a:off x="7280403" y="2490483"/>
+                  <a:ext cx="450937" cy="450937"/>
+                </a:xfrm>
+                <a:prstGeom prst="ellipse">
+                  <a:avLst/>
+                </a:prstGeom>
+                <a:solidFill>
+                  <a:schemeClr val="bg1"/>
+                </a:solidFill>
+              </p:spPr>
+              <p:style>
+                <a:lnRef idx="2">
+                  <a:schemeClr val="accent1">
+                    <a:shade val="50000"/>
+                  </a:schemeClr>
+                </a:lnRef>
+                <a:fillRef idx="1">
+                  <a:schemeClr val="accent1"/>
+                </a:fillRef>
+                <a:effectRef idx="0">
+                  <a:schemeClr val="accent1"/>
+                </a:effectRef>
+                <a:fontRef idx="minor">
+                  <a:schemeClr val="lt1"/>
+                </a:fontRef>
+              </p:style>
+              <p:txBody>
+                <a:bodyPr rtlCol="0" anchor="ctr"/>
+                <a:lstStyle/>
+                <a:p>
+                  <a:pPr algn="ctr"/>
+                  <a:endParaRPr lang="en-CA"/>
+                </a:p>
+              </p:txBody>
+            </p:sp>
+          </p:grpSp>
+          <p:grpSp>
+            <p:nvGrpSpPr>
+              <p:cNvPr id="60" name="Group 59">
+                <a:extLst>
+                  <a:ext uri="{FF2B5EF4-FFF2-40B4-BE49-F238E27FC236}">
+                    <a16:creationId xmlns:a16="http://schemas.microsoft.com/office/drawing/2014/main" id="{AEEEF8D1-8736-4B86-AD69-A4E33EDBA3D5}"/>
+                  </a:ext>
+                </a:extLst>
+              </p:cNvPr>
+              <p:cNvGrpSpPr/>
+              <p:nvPr/>
+            </p:nvGrpSpPr>
+            <p:grpSpPr>
+              <a:xfrm>
+                <a:off x="3555825" y="3048828"/>
+                <a:ext cx="4175515" cy="458608"/>
+                <a:chOff x="3555825" y="2482812"/>
+                <a:chExt cx="4175515" cy="458608"/>
+              </a:xfrm>
+            </p:grpSpPr>
+            <p:sp>
+              <p:nvSpPr>
+                <p:cNvPr id="93" name="Oval 92">
+                  <a:extLst>
+                    <a:ext uri="{FF2B5EF4-FFF2-40B4-BE49-F238E27FC236}">
+                      <a16:creationId xmlns:a16="http://schemas.microsoft.com/office/drawing/2014/main" id="{737CCB93-B57D-474D-A211-4D8488F62266}"/>
+                    </a:ext>
+                  </a:extLst>
+                </p:cNvPr>
+                <p:cNvSpPr/>
+                <p:nvPr/>
+              </p:nvSpPr>
+              <p:spPr>
+                <a:xfrm>
+                  <a:off x="3555825" y="2484619"/>
+                  <a:ext cx="450937" cy="450937"/>
+                </a:xfrm>
+                <a:prstGeom prst="ellipse">
+                  <a:avLst/>
+                </a:prstGeom>
+                <a:solidFill>
+                  <a:schemeClr val="bg1"/>
+                </a:solidFill>
+              </p:spPr>
+              <p:style>
+                <a:lnRef idx="2">
+                  <a:schemeClr val="accent1">
+                    <a:shade val="50000"/>
+                  </a:schemeClr>
+                </a:lnRef>
+                <a:fillRef idx="1">
+                  <a:schemeClr val="accent1"/>
+                </a:fillRef>
+                <a:effectRef idx="0">
+                  <a:schemeClr val="accent1"/>
+                </a:effectRef>
+                <a:fontRef idx="minor">
+                  <a:schemeClr val="lt1"/>
+                </a:fontRef>
+              </p:style>
+              <p:txBody>
+                <a:bodyPr rtlCol="0" anchor="ctr"/>
+                <a:lstStyle/>
+                <a:p>
+                  <a:pPr algn="ctr"/>
+                  <a:endParaRPr lang="en-CA"/>
+                </a:p>
+              </p:txBody>
+            </p:sp>
+            <p:sp>
+              <p:nvSpPr>
+                <p:cNvPr id="94" name="Oval 93">
+                  <a:extLst>
+                    <a:ext uri="{FF2B5EF4-FFF2-40B4-BE49-F238E27FC236}">
+                      <a16:creationId xmlns:a16="http://schemas.microsoft.com/office/drawing/2014/main" id="{29DC3B86-6EED-4702-A1BE-9D957D4D68BF}"/>
+                    </a:ext>
+                  </a:extLst>
+                </p:cNvPr>
+                <p:cNvSpPr/>
+                <p:nvPr/>
+              </p:nvSpPr>
+              <p:spPr>
+                <a:xfrm>
+                  <a:off x="4167862" y="2484615"/>
+                  <a:ext cx="450937" cy="450937"/>
+                </a:xfrm>
+                <a:prstGeom prst="ellipse">
+                  <a:avLst/>
+                </a:prstGeom>
+                <a:solidFill>
+                  <a:schemeClr val="bg1"/>
+                </a:solidFill>
+              </p:spPr>
+              <p:style>
+                <a:lnRef idx="2">
+                  <a:schemeClr val="accent1">
+                    <a:shade val="50000"/>
+                  </a:schemeClr>
+                </a:lnRef>
+                <a:fillRef idx="1">
+                  <a:schemeClr val="accent1"/>
+                </a:fillRef>
+                <a:effectRef idx="0">
+                  <a:schemeClr val="accent1"/>
+                </a:effectRef>
+                <a:fontRef idx="minor">
+                  <a:schemeClr val="lt1"/>
+                </a:fontRef>
+              </p:style>
+              <p:txBody>
+                <a:bodyPr rtlCol="0" anchor="ctr"/>
+                <a:lstStyle/>
+                <a:p>
+                  <a:pPr algn="ctr"/>
+                  <a:endParaRPr lang="en-CA" dirty="0"/>
+                </a:p>
+              </p:txBody>
+            </p:sp>
+            <p:sp>
+              <p:nvSpPr>
+                <p:cNvPr id="95" name="Oval 94">
+                  <a:extLst>
+                    <a:ext uri="{FF2B5EF4-FFF2-40B4-BE49-F238E27FC236}">
+                      <a16:creationId xmlns:a16="http://schemas.microsoft.com/office/drawing/2014/main" id="{A8003ECC-926C-4EEE-A4FF-CB9CE3F870AD}"/>
+                    </a:ext>
+                  </a:extLst>
+                </p:cNvPr>
+                <p:cNvSpPr/>
+                <p:nvPr/>
+              </p:nvSpPr>
+              <p:spPr>
+                <a:xfrm>
+                  <a:off x="4798013" y="2484615"/>
+                  <a:ext cx="450937" cy="450937"/>
+                </a:xfrm>
+                <a:prstGeom prst="ellipse">
+                  <a:avLst/>
+                </a:prstGeom>
+                <a:solidFill>
+                  <a:schemeClr val="bg1"/>
+                </a:solidFill>
+              </p:spPr>
+              <p:style>
+                <a:lnRef idx="2">
+                  <a:schemeClr val="accent1">
+                    <a:shade val="50000"/>
+                  </a:schemeClr>
+                </a:lnRef>
+                <a:fillRef idx="1">
+                  <a:schemeClr val="accent1"/>
+                </a:fillRef>
+                <a:effectRef idx="0">
+                  <a:schemeClr val="accent1"/>
+                </a:effectRef>
+                <a:fontRef idx="minor">
+                  <a:schemeClr val="lt1"/>
+                </a:fontRef>
+              </p:style>
+              <p:txBody>
+                <a:bodyPr rtlCol="0" anchor="ctr"/>
+                <a:lstStyle/>
+                <a:p>
+                  <a:pPr algn="ctr"/>
+                  <a:endParaRPr lang="en-CA" dirty="0"/>
+                </a:p>
+              </p:txBody>
+            </p:sp>
+            <p:sp>
+              <p:nvSpPr>
+                <p:cNvPr id="96" name="Oval 95">
+                  <a:extLst>
+                    <a:ext uri="{FF2B5EF4-FFF2-40B4-BE49-F238E27FC236}">
+                      <a16:creationId xmlns:a16="http://schemas.microsoft.com/office/drawing/2014/main" id="{1798A1E6-A1D3-42F5-A6AC-4BF5876A00D1}"/>
+                    </a:ext>
+                  </a:extLst>
+                </p:cNvPr>
+                <p:cNvSpPr/>
+                <p:nvPr/>
+              </p:nvSpPr>
+              <p:spPr>
+                <a:xfrm>
+                  <a:off x="5377144" y="2484616"/>
+                  <a:ext cx="450937" cy="450937"/>
+                </a:xfrm>
+                <a:prstGeom prst="ellipse">
+                  <a:avLst/>
+                </a:prstGeom>
+                <a:solidFill>
+                  <a:schemeClr val="bg1"/>
+                </a:solidFill>
+              </p:spPr>
+              <p:style>
+                <a:lnRef idx="2">
+                  <a:schemeClr val="accent1">
+                    <a:shade val="50000"/>
+                  </a:schemeClr>
+                </a:lnRef>
+                <a:fillRef idx="1">
+                  <a:schemeClr val="accent1"/>
+                </a:fillRef>
+                <a:effectRef idx="0">
+                  <a:schemeClr val="accent1"/>
+                </a:effectRef>
+                <a:fontRef idx="minor">
+                  <a:schemeClr val="lt1"/>
+                </a:fontRef>
+              </p:style>
+              <p:txBody>
+                <a:bodyPr rtlCol="0" anchor="ctr"/>
+                <a:lstStyle/>
+                <a:p>
+                  <a:pPr algn="ctr"/>
+                  <a:endParaRPr lang="en-CA" dirty="0"/>
+                </a:p>
+              </p:txBody>
+            </p:sp>
+            <p:sp>
+              <p:nvSpPr>
+                <p:cNvPr id="97" name="Oval 96">
+                  <a:extLst>
+                    <a:ext uri="{FF2B5EF4-FFF2-40B4-BE49-F238E27FC236}">
+                      <a16:creationId xmlns:a16="http://schemas.microsoft.com/office/drawing/2014/main" id="{29C38E17-2746-45C4-9DD2-4432A662C541}"/>
+                    </a:ext>
+                  </a:extLst>
+                </p:cNvPr>
+                <p:cNvSpPr/>
+                <p:nvPr/>
+              </p:nvSpPr>
+              <p:spPr>
+                <a:xfrm>
+                  <a:off x="6007295" y="2484614"/>
+                  <a:ext cx="450937" cy="450937"/>
+                </a:xfrm>
+                <a:prstGeom prst="ellipse">
+                  <a:avLst/>
+                </a:prstGeom>
+                <a:solidFill>
+                  <a:schemeClr val="bg1"/>
+                </a:solidFill>
+              </p:spPr>
+              <p:style>
+                <a:lnRef idx="2">
+                  <a:schemeClr val="accent1">
+                    <a:shade val="50000"/>
+                  </a:schemeClr>
+                </a:lnRef>
+                <a:fillRef idx="1">
+                  <a:schemeClr val="accent1"/>
+                </a:fillRef>
+                <a:effectRef idx="0">
+                  <a:schemeClr val="accent1"/>
+                </a:effectRef>
+                <a:fontRef idx="minor">
+                  <a:schemeClr val="lt1"/>
+                </a:fontRef>
+              </p:style>
+              <p:txBody>
+                <a:bodyPr rtlCol="0" anchor="ctr"/>
+                <a:lstStyle/>
+                <a:p>
+                  <a:pPr algn="ctr"/>
+                  <a:endParaRPr lang="en-CA" dirty="0"/>
+                </a:p>
+              </p:txBody>
+            </p:sp>
+            <p:sp>
+              <p:nvSpPr>
+                <p:cNvPr id="98" name="Oval 97">
+                  <a:extLst>
+                    <a:ext uri="{FF2B5EF4-FFF2-40B4-BE49-F238E27FC236}">
+                      <a16:creationId xmlns:a16="http://schemas.microsoft.com/office/drawing/2014/main" id="{99D8C0CF-E72E-470C-8852-4809ECE95ADA}"/>
+                    </a:ext>
+                  </a:extLst>
+                </p:cNvPr>
+                <p:cNvSpPr/>
+                <p:nvPr/>
+              </p:nvSpPr>
+              <p:spPr>
+                <a:xfrm>
+                  <a:off x="6668366" y="2482812"/>
+                  <a:ext cx="450937" cy="450937"/>
+                </a:xfrm>
+                <a:prstGeom prst="ellipse">
+                  <a:avLst/>
+                </a:prstGeom>
+                <a:solidFill>
+                  <a:schemeClr val="bg1"/>
+                </a:solidFill>
+              </p:spPr>
+              <p:style>
+                <a:lnRef idx="2">
+                  <a:schemeClr val="accent1">
+                    <a:shade val="50000"/>
+                  </a:schemeClr>
+                </a:lnRef>
+                <a:fillRef idx="1">
+                  <a:schemeClr val="accent1"/>
+                </a:fillRef>
+                <a:effectRef idx="0">
+                  <a:schemeClr val="accent1"/>
+                </a:effectRef>
+                <a:fontRef idx="minor">
+                  <a:schemeClr val="lt1"/>
+                </a:fontRef>
+              </p:style>
+              <p:txBody>
+                <a:bodyPr rtlCol="0" anchor="ctr"/>
+                <a:lstStyle/>
+                <a:p>
+                  <a:pPr algn="ctr"/>
+                  <a:endParaRPr lang="en-CA" dirty="0"/>
+                </a:p>
+              </p:txBody>
+            </p:sp>
+            <p:sp>
+              <p:nvSpPr>
+                <p:cNvPr id="99" name="Oval 98">
+                  <a:extLst>
+                    <a:ext uri="{FF2B5EF4-FFF2-40B4-BE49-F238E27FC236}">
+                      <a16:creationId xmlns:a16="http://schemas.microsoft.com/office/drawing/2014/main" id="{58E360CC-368D-4CEB-9298-A2AD1B092755}"/>
+                    </a:ext>
+                  </a:extLst>
+                </p:cNvPr>
+                <p:cNvSpPr/>
+                <p:nvPr/>
+              </p:nvSpPr>
+              <p:spPr>
+                <a:xfrm>
+                  <a:off x="7280403" y="2490483"/>
+                  <a:ext cx="450937" cy="450937"/>
+                </a:xfrm>
+                <a:prstGeom prst="ellipse">
+                  <a:avLst/>
+                </a:prstGeom>
+                <a:solidFill>
+                  <a:schemeClr val="bg1"/>
+                </a:solidFill>
+              </p:spPr>
+              <p:style>
+                <a:lnRef idx="2">
+                  <a:schemeClr val="accent1">
+                    <a:shade val="50000"/>
+                  </a:schemeClr>
+                </a:lnRef>
+                <a:fillRef idx="1">
+                  <a:schemeClr val="accent1"/>
+                </a:fillRef>
+                <a:effectRef idx="0">
+                  <a:schemeClr val="accent1"/>
+                </a:effectRef>
+                <a:fontRef idx="minor">
+                  <a:schemeClr val="lt1"/>
+                </a:fontRef>
+              </p:style>
+              <p:txBody>
+                <a:bodyPr rtlCol="0" anchor="ctr"/>
+                <a:lstStyle/>
+                <a:p>
+                  <a:pPr algn="ctr"/>
+                  <a:endParaRPr lang="en-CA"/>
+                </a:p>
+              </p:txBody>
+            </p:sp>
+          </p:grpSp>
+          <p:grpSp>
+            <p:nvGrpSpPr>
+              <p:cNvPr id="61" name="Group 60">
+                <a:extLst>
+                  <a:ext uri="{FF2B5EF4-FFF2-40B4-BE49-F238E27FC236}">
+                    <a16:creationId xmlns:a16="http://schemas.microsoft.com/office/drawing/2014/main" id="{8209FA3C-F758-4E44-A989-D43B675F1440}"/>
+                  </a:ext>
+                </a:extLst>
+              </p:cNvPr>
+              <p:cNvGrpSpPr/>
+              <p:nvPr/>
+            </p:nvGrpSpPr>
+            <p:grpSpPr>
+              <a:xfrm>
+                <a:off x="3567741" y="3616646"/>
+                <a:ext cx="4175515" cy="458608"/>
+                <a:chOff x="3555825" y="2482812"/>
+                <a:chExt cx="4175515" cy="458608"/>
+              </a:xfrm>
+            </p:grpSpPr>
+            <p:sp>
+              <p:nvSpPr>
+                <p:cNvPr id="86" name="Oval 85">
+                  <a:extLst>
+                    <a:ext uri="{FF2B5EF4-FFF2-40B4-BE49-F238E27FC236}">
+                      <a16:creationId xmlns:a16="http://schemas.microsoft.com/office/drawing/2014/main" id="{E0778333-AA27-49DD-AAE9-9D94948175DC}"/>
+                    </a:ext>
+                  </a:extLst>
+                </p:cNvPr>
+                <p:cNvSpPr/>
+                <p:nvPr/>
+              </p:nvSpPr>
+              <p:spPr>
+                <a:xfrm>
+                  <a:off x="3555825" y="2484619"/>
+                  <a:ext cx="450937" cy="450937"/>
+                </a:xfrm>
+                <a:prstGeom prst="ellipse">
+                  <a:avLst/>
+                </a:prstGeom>
+                <a:solidFill>
+                  <a:schemeClr val="bg1"/>
+                </a:solidFill>
+              </p:spPr>
+              <p:style>
+                <a:lnRef idx="2">
+                  <a:schemeClr val="accent1">
+                    <a:shade val="50000"/>
+                  </a:schemeClr>
+                </a:lnRef>
+                <a:fillRef idx="1">
+                  <a:schemeClr val="accent1"/>
+                </a:fillRef>
+                <a:effectRef idx="0">
+                  <a:schemeClr val="accent1"/>
+                </a:effectRef>
+                <a:fontRef idx="minor">
+                  <a:schemeClr val="lt1"/>
+                </a:fontRef>
+              </p:style>
+              <p:txBody>
+                <a:bodyPr rtlCol="0" anchor="ctr"/>
+                <a:lstStyle/>
+                <a:p>
+                  <a:pPr algn="ctr"/>
+                  <a:endParaRPr lang="en-CA"/>
+                </a:p>
+              </p:txBody>
+            </p:sp>
+            <p:sp>
+              <p:nvSpPr>
+                <p:cNvPr id="87" name="Oval 86">
+                  <a:extLst>
+                    <a:ext uri="{FF2B5EF4-FFF2-40B4-BE49-F238E27FC236}">
+                      <a16:creationId xmlns:a16="http://schemas.microsoft.com/office/drawing/2014/main" id="{02B22438-C6A6-4233-8F31-F20FAB1D5334}"/>
+                    </a:ext>
+                  </a:extLst>
+                </p:cNvPr>
+                <p:cNvSpPr/>
+                <p:nvPr/>
+              </p:nvSpPr>
+              <p:spPr>
+                <a:xfrm>
+                  <a:off x="4167862" y="2484615"/>
+                  <a:ext cx="450937" cy="450937"/>
+                </a:xfrm>
+                <a:prstGeom prst="ellipse">
+                  <a:avLst/>
+                </a:prstGeom>
+                <a:solidFill>
+                  <a:schemeClr val="bg1"/>
+                </a:solidFill>
+              </p:spPr>
+              <p:style>
+                <a:lnRef idx="2">
+                  <a:schemeClr val="accent1">
+                    <a:shade val="50000"/>
+                  </a:schemeClr>
+                </a:lnRef>
+                <a:fillRef idx="1">
+                  <a:schemeClr val="accent1"/>
+                </a:fillRef>
+                <a:effectRef idx="0">
+                  <a:schemeClr val="accent1"/>
+                </a:effectRef>
+                <a:fontRef idx="minor">
+                  <a:schemeClr val="lt1"/>
+                </a:fontRef>
+              </p:style>
+              <p:txBody>
+                <a:bodyPr rtlCol="0" anchor="ctr"/>
+                <a:lstStyle/>
+                <a:p>
+                  <a:pPr algn="ctr"/>
+                  <a:endParaRPr lang="en-CA" dirty="0"/>
+                </a:p>
+              </p:txBody>
+            </p:sp>
+            <p:sp>
+              <p:nvSpPr>
+                <p:cNvPr id="88" name="Oval 87">
+                  <a:extLst>
+                    <a:ext uri="{FF2B5EF4-FFF2-40B4-BE49-F238E27FC236}">
+                      <a16:creationId xmlns:a16="http://schemas.microsoft.com/office/drawing/2014/main" id="{A1C0A3B1-0B22-4076-B517-21C1D8167B7A}"/>
+                    </a:ext>
+                  </a:extLst>
+                </p:cNvPr>
+                <p:cNvSpPr/>
+                <p:nvPr/>
+              </p:nvSpPr>
+              <p:spPr>
+                <a:xfrm>
+                  <a:off x="4798013" y="2484615"/>
+                  <a:ext cx="450937" cy="450937"/>
+                </a:xfrm>
+                <a:prstGeom prst="ellipse">
+                  <a:avLst/>
+                </a:prstGeom>
+                <a:solidFill>
+                  <a:schemeClr val="bg1"/>
+                </a:solidFill>
+              </p:spPr>
+              <p:style>
+                <a:lnRef idx="2">
+                  <a:schemeClr val="accent1">
+                    <a:shade val="50000"/>
+                  </a:schemeClr>
+                </a:lnRef>
+                <a:fillRef idx="1">
+                  <a:schemeClr val="accent1"/>
+                </a:fillRef>
+                <a:effectRef idx="0">
+                  <a:schemeClr val="accent1"/>
+                </a:effectRef>
+                <a:fontRef idx="minor">
+                  <a:schemeClr val="lt1"/>
+                </a:fontRef>
+              </p:style>
+              <p:txBody>
+                <a:bodyPr rtlCol="0" anchor="ctr"/>
+                <a:lstStyle/>
+                <a:p>
+                  <a:pPr algn="ctr"/>
+                  <a:endParaRPr lang="en-CA" dirty="0"/>
+                </a:p>
+              </p:txBody>
+            </p:sp>
+            <p:sp>
+              <p:nvSpPr>
+                <p:cNvPr id="89" name="Oval 88">
+                  <a:extLst>
+                    <a:ext uri="{FF2B5EF4-FFF2-40B4-BE49-F238E27FC236}">
+                      <a16:creationId xmlns:a16="http://schemas.microsoft.com/office/drawing/2014/main" id="{B5CB7899-EF66-427F-AD9B-C6A99CE4448A}"/>
+                    </a:ext>
+                  </a:extLst>
+                </p:cNvPr>
+                <p:cNvSpPr/>
+                <p:nvPr/>
+              </p:nvSpPr>
+              <p:spPr>
+                <a:xfrm>
+                  <a:off x="5377144" y="2484616"/>
+                  <a:ext cx="450937" cy="450937"/>
+                </a:xfrm>
+                <a:prstGeom prst="ellipse">
+                  <a:avLst/>
+                </a:prstGeom>
+                <a:solidFill>
+                  <a:schemeClr val="bg1"/>
+                </a:solidFill>
+              </p:spPr>
+              <p:style>
+                <a:lnRef idx="2">
+                  <a:schemeClr val="accent1">
+                    <a:shade val="50000"/>
+                  </a:schemeClr>
+                </a:lnRef>
+                <a:fillRef idx="1">
+                  <a:schemeClr val="accent1"/>
+                </a:fillRef>
+                <a:effectRef idx="0">
+                  <a:schemeClr val="accent1"/>
+                </a:effectRef>
+                <a:fontRef idx="minor">
+                  <a:schemeClr val="lt1"/>
+                </a:fontRef>
+              </p:style>
+              <p:txBody>
+                <a:bodyPr rtlCol="0" anchor="ctr"/>
+                <a:lstStyle/>
+                <a:p>
+                  <a:pPr algn="ctr"/>
+                  <a:endParaRPr lang="en-CA" dirty="0"/>
+                </a:p>
+              </p:txBody>
+            </p:sp>
+            <p:sp>
+              <p:nvSpPr>
+                <p:cNvPr id="90" name="Oval 89">
+                  <a:extLst>
+                    <a:ext uri="{FF2B5EF4-FFF2-40B4-BE49-F238E27FC236}">
+                      <a16:creationId xmlns:a16="http://schemas.microsoft.com/office/drawing/2014/main" id="{AE6AF8C7-32E0-422F-9E28-912D4D282619}"/>
+                    </a:ext>
+                  </a:extLst>
+                </p:cNvPr>
+                <p:cNvSpPr/>
+                <p:nvPr/>
+              </p:nvSpPr>
+              <p:spPr>
+                <a:xfrm>
+                  <a:off x="6007295" y="2484614"/>
+                  <a:ext cx="450937" cy="450937"/>
+                </a:xfrm>
+                <a:prstGeom prst="ellipse">
+                  <a:avLst/>
+                </a:prstGeom>
+                <a:solidFill>
+                  <a:schemeClr val="bg1"/>
+                </a:solidFill>
+              </p:spPr>
+              <p:style>
+                <a:lnRef idx="2">
+                  <a:schemeClr val="accent1">
+                    <a:shade val="50000"/>
+                  </a:schemeClr>
+                </a:lnRef>
+                <a:fillRef idx="1">
+                  <a:schemeClr val="accent1"/>
+                </a:fillRef>
+                <a:effectRef idx="0">
+                  <a:schemeClr val="accent1"/>
+                </a:effectRef>
+                <a:fontRef idx="minor">
+                  <a:schemeClr val="lt1"/>
+                </a:fontRef>
+              </p:style>
+              <p:txBody>
+                <a:bodyPr rtlCol="0" anchor="ctr"/>
+                <a:lstStyle/>
+                <a:p>
+                  <a:pPr algn="ctr"/>
+                  <a:endParaRPr lang="en-CA" dirty="0"/>
+                </a:p>
+              </p:txBody>
+            </p:sp>
+            <p:sp>
+              <p:nvSpPr>
+                <p:cNvPr id="91" name="Oval 90">
+                  <a:extLst>
+                    <a:ext uri="{FF2B5EF4-FFF2-40B4-BE49-F238E27FC236}">
+                      <a16:creationId xmlns:a16="http://schemas.microsoft.com/office/drawing/2014/main" id="{56064D27-A669-4EA2-ABBD-58DD5322F051}"/>
+                    </a:ext>
+                  </a:extLst>
+                </p:cNvPr>
+                <p:cNvSpPr/>
+                <p:nvPr/>
+              </p:nvSpPr>
+              <p:spPr>
+                <a:xfrm>
+                  <a:off x="6668366" y="2482812"/>
+                  <a:ext cx="450937" cy="450937"/>
+                </a:xfrm>
+                <a:prstGeom prst="ellipse">
+                  <a:avLst/>
+                </a:prstGeom>
+                <a:solidFill>
+                  <a:schemeClr val="bg1"/>
+                </a:solidFill>
+              </p:spPr>
+              <p:style>
+                <a:lnRef idx="2">
+                  <a:schemeClr val="accent1">
+                    <a:shade val="50000"/>
+                  </a:schemeClr>
+                </a:lnRef>
+                <a:fillRef idx="1">
+                  <a:schemeClr val="accent1"/>
+                </a:fillRef>
+                <a:effectRef idx="0">
+                  <a:schemeClr val="accent1"/>
+                </a:effectRef>
+                <a:fontRef idx="minor">
+                  <a:schemeClr val="lt1"/>
+                </a:fontRef>
+              </p:style>
+              <p:txBody>
+                <a:bodyPr rtlCol="0" anchor="ctr"/>
+                <a:lstStyle/>
+                <a:p>
+                  <a:pPr algn="ctr"/>
+                  <a:endParaRPr lang="en-CA" dirty="0"/>
+                </a:p>
+              </p:txBody>
+            </p:sp>
+            <p:sp>
+              <p:nvSpPr>
+                <p:cNvPr id="92" name="Oval 91">
+                  <a:extLst>
+                    <a:ext uri="{FF2B5EF4-FFF2-40B4-BE49-F238E27FC236}">
+                      <a16:creationId xmlns:a16="http://schemas.microsoft.com/office/drawing/2014/main" id="{E150941B-E85C-45C8-A1AF-361D446E7456}"/>
+                    </a:ext>
+                  </a:extLst>
+                </p:cNvPr>
+                <p:cNvSpPr/>
+                <p:nvPr/>
+              </p:nvSpPr>
+              <p:spPr>
+                <a:xfrm>
+                  <a:off x="7280403" y="2490483"/>
+                  <a:ext cx="450937" cy="450937"/>
+                </a:xfrm>
+                <a:prstGeom prst="ellipse">
+                  <a:avLst/>
+                </a:prstGeom>
+                <a:solidFill>
+                  <a:schemeClr val="bg1"/>
+                </a:solidFill>
+              </p:spPr>
+              <p:style>
+                <a:lnRef idx="2">
+                  <a:schemeClr val="accent1">
+                    <a:shade val="50000"/>
+                  </a:schemeClr>
+                </a:lnRef>
+                <a:fillRef idx="1">
+                  <a:schemeClr val="accent1"/>
+                </a:fillRef>
+                <a:effectRef idx="0">
+                  <a:schemeClr val="accent1"/>
+                </a:effectRef>
+                <a:fontRef idx="minor">
+                  <a:schemeClr val="lt1"/>
+                </a:fontRef>
+              </p:style>
+              <p:txBody>
+                <a:bodyPr rtlCol="0" anchor="ctr"/>
+                <a:lstStyle/>
+                <a:p>
+                  <a:pPr algn="ctr"/>
+                  <a:endParaRPr lang="en-CA"/>
+                </a:p>
+              </p:txBody>
+            </p:sp>
+          </p:grpSp>
+          <p:grpSp>
+            <p:nvGrpSpPr>
+              <p:cNvPr id="62" name="Group 61">
+                <a:extLst>
+                  <a:ext uri="{FF2B5EF4-FFF2-40B4-BE49-F238E27FC236}">
+                    <a16:creationId xmlns:a16="http://schemas.microsoft.com/office/drawing/2014/main" id="{A5378DCB-4CB7-4D7C-AD01-E7665A54B565}"/>
+                  </a:ext>
+                </a:extLst>
+              </p:cNvPr>
+              <p:cNvGrpSpPr/>
+              <p:nvPr/>
+            </p:nvGrpSpPr>
+            <p:grpSpPr>
+              <a:xfrm>
+                <a:off x="3567741" y="4238511"/>
+                <a:ext cx="4175515" cy="458608"/>
+                <a:chOff x="3555825" y="2482812"/>
+                <a:chExt cx="4175515" cy="458608"/>
+              </a:xfrm>
+            </p:grpSpPr>
+            <p:sp>
+              <p:nvSpPr>
+                <p:cNvPr id="79" name="Oval 78">
+                  <a:extLst>
+                    <a:ext uri="{FF2B5EF4-FFF2-40B4-BE49-F238E27FC236}">
+                      <a16:creationId xmlns:a16="http://schemas.microsoft.com/office/drawing/2014/main" id="{12997617-4FD3-4B2D-8A3C-D11ABFE7D85F}"/>
+                    </a:ext>
+                  </a:extLst>
+                </p:cNvPr>
+                <p:cNvSpPr/>
+                <p:nvPr/>
+              </p:nvSpPr>
+              <p:spPr>
+                <a:xfrm>
+                  <a:off x="3555825" y="2484619"/>
+                  <a:ext cx="450937" cy="450937"/>
+                </a:xfrm>
+                <a:prstGeom prst="ellipse">
+                  <a:avLst/>
+                </a:prstGeom>
+                <a:solidFill>
+                  <a:schemeClr val="bg1"/>
+                </a:solidFill>
+              </p:spPr>
+              <p:style>
+                <a:lnRef idx="2">
+                  <a:schemeClr val="accent1">
+                    <a:shade val="50000"/>
+                  </a:schemeClr>
+                </a:lnRef>
+                <a:fillRef idx="1">
+                  <a:schemeClr val="accent1"/>
+                </a:fillRef>
+                <a:effectRef idx="0">
+                  <a:schemeClr val="accent1"/>
+                </a:effectRef>
+                <a:fontRef idx="minor">
+                  <a:schemeClr val="lt1"/>
+                </a:fontRef>
+              </p:style>
+              <p:txBody>
+                <a:bodyPr rtlCol="0" anchor="ctr"/>
+                <a:lstStyle/>
+                <a:p>
+                  <a:pPr algn="ctr"/>
+                  <a:endParaRPr lang="en-CA"/>
+                </a:p>
+              </p:txBody>
+            </p:sp>
+            <p:sp>
+              <p:nvSpPr>
+                <p:cNvPr id="80" name="Oval 79">
+                  <a:extLst>
+                    <a:ext uri="{FF2B5EF4-FFF2-40B4-BE49-F238E27FC236}">
+                      <a16:creationId xmlns:a16="http://schemas.microsoft.com/office/drawing/2014/main" id="{926FC65E-2CF4-4F0B-8F40-3D00A156108F}"/>
+                    </a:ext>
+                  </a:extLst>
+                </p:cNvPr>
+                <p:cNvSpPr/>
+                <p:nvPr/>
+              </p:nvSpPr>
+              <p:spPr>
+                <a:xfrm>
+                  <a:off x="4167862" y="2484615"/>
+                  <a:ext cx="450937" cy="450937"/>
+                </a:xfrm>
+                <a:prstGeom prst="ellipse">
+                  <a:avLst/>
+                </a:prstGeom>
+                <a:solidFill>
+                  <a:schemeClr val="bg1"/>
+                </a:solidFill>
+              </p:spPr>
+              <p:style>
+                <a:lnRef idx="2">
+                  <a:schemeClr val="accent1">
+                    <a:shade val="50000"/>
+                  </a:schemeClr>
+                </a:lnRef>
+                <a:fillRef idx="1">
+                  <a:schemeClr val="accent1"/>
+                </a:fillRef>
+                <a:effectRef idx="0">
+                  <a:schemeClr val="accent1"/>
+                </a:effectRef>
+                <a:fontRef idx="minor">
+                  <a:schemeClr val="lt1"/>
+                </a:fontRef>
+              </p:style>
+              <p:txBody>
+                <a:bodyPr rtlCol="0" anchor="ctr"/>
+                <a:lstStyle/>
+                <a:p>
+                  <a:pPr algn="ctr"/>
+                  <a:endParaRPr lang="en-CA" dirty="0"/>
+                </a:p>
+              </p:txBody>
+            </p:sp>
+            <p:sp>
+              <p:nvSpPr>
+                <p:cNvPr id="81" name="Oval 80">
+                  <a:extLst>
+                    <a:ext uri="{FF2B5EF4-FFF2-40B4-BE49-F238E27FC236}">
+                      <a16:creationId xmlns:a16="http://schemas.microsoft.com/office/drawing/2014/main" id="{B840E2D4-CFAE-41F4-9313-2AE545517D36}"/>
+                    </a:ext>
+                  </a:extLst>
+                </p:cNvPr>
+                <p:cNvSpPr/>
+                <p:nvPr/>
+              </p:nvSpPr>
+              <p:spPr>
+                <a:xfrm>
+                  <a:off x="4798013" y="2484615"/>
+                  <a:ext cx="450937" cy="450937"/>
+                </a:xfrm>
+                <a:prstGeom prst="ellipse">
+                  <a:avLst/>
+                </a:prstGeom>
+                <a:solidFill>
+                  <a:schemeClr val="bg1"/>
+                </a:solidFill>
+              </p:spPr>
+              <p:style>
+                <a:lnRef idx="2">
+                  <a:schemeClr val="accent1">
+                    <a:shade val="50000"/>
+                  </a:schemeClr>
+                </a:lnRef>
+                <a:fillRef idx="1">
+                  <a:schemeClr val="accent1"/>
+                </a:fillRef>
+                <a:effectRef idx="0">
+                  <a:schemeClr val="accent1"/>
+                </a:effectRef>
+                <a:fontRef idx="minor">
+                  <a:schemeClr val="lt1"/>
+                </a:fontRef>
+              </p:style>
+              <p:txBody>
+                <a:bodyPr rtlCol="0" anchor="ctr"/>
+                <a:lstStyle/>
+                <a:p>
+                  <a:pPr algn="ctr"/>
+                  <a:endParaRPr lang="en-CA" dirty="0"/>
+                </a:p>
+              </p:txBody>
+            </p:sp>
+            <p:sp>
+              <p:nvSpPr>
+                <p:cNvPr id="82" name="Oval 81">
+                  <a:extLst>
+                    <a:ext uri="{FF2B5EF4-FFF2-40B4-BE49-F238E27FC236}">
+                      <a16:creationId xmlns:a16="http://schemas.microsoft.com/office/drawing/2014/main" id="{5FC22A26-A7E6-4093-AC28-0422CF015247}"/>
+                    </a:ext>
+                  </a:extLst>
+                </p:cNvPr>
+                <p:cNvSpPr/>
+                <p:nvPr/>
+              </p:nvSpPr>
+              <p:spPr>
+                <a:xfrm>
+                  <a:off x="5377144" y="2484616"/>
+                  <a:ext cx="450937" cy="450937"/>
+                </a:xfrm>
+                <a:prstGeom prst="ellipse">
+                  <a:avLst/>
+                </a:prstGeom>
+                <a:solidFill>
+                  <a:schemeClr val="bg1"/>
+                </a:solidFill>
+              </p:spPr>
+              <p:style>
+                <a:lnRef idx="2">
+                  <a:schemeClr val="accent1">
+                    <a:shade val="50000"/>
+                  </a:schemeClr>
+                </a:lnRef>
+                <a:fillRef idx="1">
+                  <a:schemeClr val="accent1"/>
+                </a:fillRef>
+                <a:effectRef idx="0">
+                  <a:schemeClr val="accent1"/>
+                </a:effectRef>
+                <a:fontRef idx="minor">
+                  <a:schemeClr val="lt1"/>
+                </a:fontRef>
+              </p:style>
+              <p:txBody>
+                <a:bodyPr rtlCol="0" anchor="ctr"/>
+                <a:lstStyle/>
+                <a:p>
+                  <a:pPr algn="ctr"/>
+                  <a:endParaRPr lang="en-CA" dirty="0"/>
+                </a:p>
+              </p:txBody>
+            </p:sp>
+            <p:sp>
+              <p:nvSpPr>
+                <p:cNvPr id="83" name="Oval 82">
+                  <a:extLst>
+                    <a:ext uri="{FF2B5EF4-FFF2-40B4-BE49-F238E27FC236}">
+                      <a16:creationId xmlns:a16="http://schemas.microsoft.com/office/drawing/2014/main" id="{F25A4215-2779-46F7-8CCE-85A0DAE8BC1E}"/>
+                    </a:ext>
+                  </a:extLst>
+                </p:cNvPr>
+                <p:cNvSpPr/>
+                <p:nvPr/>
+              </p:nvSpPr>
+              <p:spPr>
+                <a:xfrm>
+                  <a:off x="6007295" y="2484614"/>
+                  <a:ext cx="450937" cy="450937"/>
+                </a:xfrm>
+                <a:prstGeom prst="ellipse">
+                  <a:avLst/>
+                </a:prstGeom>
+                <a:solidFill>
+                  <a:schemeClr val="bg1"/>
+                </a:solidFill>
+              </p:spPr>
+              <p:style>
+                <a:lnRef idx="2">
+                  <a:schemeClr val="accent1">
+                    <a:shade val="50000"/>
+                  </a:schemeClr>
+                </a:lnRef>
+                <a:fillRef idx="1">
+                  <a:schemeClr val="accent1"/>
+                </a:fillRef>
+                <a:effectRef idx="0">
+                  <a:schemeClr val="accent1"/>
+                </a:effectRef>
+                <a:fontRef idx="minor">
+                  <a:schemeClr val="lt1"/>
+                </a:fontRef>
+              </p:style>
+              <p:txBody>
+                <a:bodyPr rtlCol="0" anchor="ctr"/>
+                <a:lstStyle/>
+                <a:p>
+                  <a:pPr algn="ctr"/>
+                  <a:endParaRPr lang="en-CA" dirty="0"/>
+                </a:p>
+              </p:txBody>
+            </p:sp>
+            <p:sp>
+              <p:nvSpPr>
+                <p:cNvPr id="84" name="Oval 83">
+                  <a:extLst>
+                    <a:ext uri="{FF2B5EF4-FFF2-40B4-BE49-F238E27FC236}">
+                      <a16:creationId xmlns:a16="http://schemas.microsoft.com/office/drawing/2014/main" id="{7B42D206-5A82-459D-8661-24B3E9D9DD2B}"/>
+                    </a:ext>
+                  </a:extLst>
+                </p:cNvPr>
+                <p:cNvSpPr/>
+                <p:nvPr/>
+              </p:nvSpPr>
+              <p:spPr>
+                <a:xfrm>
+                  <a:off x="6668366" y="2482812"/>
+                  <a:ext cx="450937" cy="450937"/>
+                </a:xfrm>
+                <a:prstGeom prst="ellipse">
+                  <a:avLst/>
+                </a:prstGeom>
+                <a:solidFill>
+                  <a:schemeClr val="bg1"/>
+                </a:solidFill>
+              </p:spPr>
+              <p:style>
+                <a:lnRef idx="2">
+                  <a:schemeClr val="accent1">
+                    <a:shade val="50000"/>
+                  </a:schemeClr>
+                </a:lnRef>
+                <a:fillRef idx="1">
+                  <a:schemeClr val="accent1"/>
+                </a:fillRef>
+                <a:effectRef idx="0">
+                  <a:schemeClr val="accent1"/>
+                </a:effectRef>
+                <a:fontRef idx="minor">
+                  <a:schemeClr val="lt1"/>
+                </a:fontRef>
+              </p:style>
+              <p:txBody>
+                <a:bodyPr rtlCol="0" anchor="ctr"/>
+                <a:lstStyle/>
+                <a:p>
+                  <a:pPr algn="ctr"/>
+                  <a:endParaRPr lang="en-CA" dirty="0"/>
+                </a:p>
+              </p:txBody>
+            </p:sp>
+            <p:sp>
+              <p:nvSpPr>
+                <p:cNvPr id="85" name="Oval 84">
+                  <a:extLst>
+                    <a:ext uri="{FF2B5EF4-FFF2-40B4-BE49-F238E27FC236}">
+                      <a16:creationId xmlns:a16="http://schemas.microsoft.com/office/drawing/2014/main" id="{12524836-C8DA-4F98-988A-0571BDC4EB73}"/>
+                    </a:ext>
+                  </a:extLst>
+                </p:cNvPr>
+                <p:cNvSpPr/>
+                <p:nvPr/>
+              </p:nvSpPr>
+              <p:spPr>
+                <a:xfrm>
+                  <a:off x="7280403" y="2490483"/>
+                  <a:ext cx="450937" cy="450937"/>
+                </a:xfrm>
+                <a:prstGeom prst="ellipse">
+                  <a:avLst/>
+                </a:prstGeom>
+                <a:solidFill>
+                  <a:schemeClr val="bg1"/>
+                </a:solidFill>
+              </p:spPr>
+              <p:style>
+                <a:lnRef idx="2">
+                  <a:schemeClr val="accent1">
+                    <a:shade val="50000"/>
+                  </a:schemeClr>
+                </a:lnRef>
+                <a:fillRef idx="1">
+                  <a:schemeClr val="accent1"/>
+                </a:fillRef>
+                <a:effectRef idx="0">
+                  <a:schemeClr val="accent1"/>
+                </a:effectRef>
+                <a:fontRef idx="minor">
+                  <a:schemeClr val="lt1"/>
+                </a:fontRef>
+              </p:style>
+              <p:txBody>
+                <a:bodyPr rtlCol="0" anchor="ctr"/>
+                <a:lstStyle/>
+                <a:p>
+                  <a:pPr algn="ctr"/>
+                  <a:endParaRPr lang="en-CA"/>
+                </a:p>
+              </p:txBody>
+            </p:sp>
+          </p:grpSp>
+          <p:grpSp>
+            <p:nvGrpSpPr>
+              <p:cNvPr id="63" name="Group 62">
+                <a:extLst>
+                  <a:ext uri="{FF2B5EF4-FFF2-40B4-BE49-F238E27FC236}">
+                    <a16:creationId xmlns:a16="http://schemas.microsoft.com/office/drawing/2014/main" id="{A9BACBC6-5534-4503-9D26-F396B1E420F4}"/>
+                  </a:ext>
+                </a:extLst>
+              </p:cNvPr>
+              <p:cNvGrpSpPr/>
+              <p:nvPr/>
+            </p:nvGrpSpPr>
+            <p:grpSpPr>
+              <a:xfrm>
+                <a:off x="3570112" y="4822406"/>
+                <a:ext cx="4175515" cy="458608"/>
+                <a:chOff x="3555825" y="2482812"/>
+                <a:chExt cx="4175515" cy="458608"/>
+              </a:xfrm>
+            </p:grpSpPr>
+            <p:sp>
+              <p:nvSpPr>
+                <p:cNvPr id="72" name="Oval 71">
+                  <a:extLst>
+                    <a:ext uri="{FF2B5EF4-FFF2-40B4-BE49-F238E27FC236}">
+                      <a16:creationId xmlns:a16="http://schemas.microsoft.com/office/drawing/2014/main" id="{EB68370A-AA1F-4B63-B8E1-8F33ADF2AFD9}"/>
+                    </a:ext>
+                  </a:extLst>
+                </p:cNvPr>
+                <p:cNvSpPr/>
+                <p:nvPr/>
+              </p:nvSpPr>
+              <p:spPr>
+                <a:xfrm>
+                  <a:off x="3555825" y="2484619"/>
+                  <a:ext cx="450937" cy="450937"/>
+                </a:xfrm>
+                <a:prstGeom prst="ellipse">
+                  <a:avLst/>
+                </a:prstGeom>
+                <a:solidFill>
+                  <a:schemeClr val="bg1"/>
+                </a:solidFill>
+              </p:spPr>
+              <p:style>
+                <a:lnRef idx="2">
+                  <a:schemeClr val="accent1">
+                    <a:shade val="50000"/>
+                  </a:schemeClr>
+                </a:lnRef>
+                <a:fillRef idx="1">
+                  <a:schemeClr val="accent1"/>
+                </a:fillRef>
+                <a:effectRef idx="0">
+                  <a:schemeClr val="accent1"/>
+                </a:effectRef>
+                <a:fontRef idx="minor">
+                  <a:schemeClr val="lt1"/>
+                </a:fontRef>
+              </p:style>
+              <p:txBody>
+                <a:bodyPr rtlCol="0" anchor="ctr"/>
+                <a:lstStyle/>
+                <a:p>
+                  <a:pPr algn="ctr"/>
+                  <a:endParaRPr lang="en-CA"/>
+                </a:p>
+              </p:txBody>
+            </p:sp>
+            <p:sp>
+              <p:nvSpPr>
+                <p:cNvPr id="73" name="Oval 72">
+                  <a:extLst>
+                    <a:ext uri="{FF2B5EF4-FFF2-40B4-BE49-F238E27FC236}">
+                      <a16:creationId xmlns:a16="http://schemas.microsoft.com/office/drawing/2014/main" id="{7EEB567F-71BE-419A-AC4C-4CA8D2125768}"/>
+                    </a:ext>
+                  </a:extLst>
+                </p:cNvPr>
+                <p:cNvSpPr/>
+                <p:nvPr/>
+              </p:nvSpPr>
+              <p:spPr>
+                <a:xfrm>
+                  <a:off x="4167862" y="2484615"/>
+                  <a:ext cx="450937" cy="450937"/>
+                </a:xfrm>
+                <a:prstGeom prst="ellipse">
+                  <a:avLst/>
+                </a:prstGeom>
+                <a:solidFill>
+                  <a:schemeClr val="bg1"/>
+                </a:solidFill>
+              </p:spPr>
+              <p:style>
+                <a:lnRef idx="2">
+                  <a:schemeClr val="accent1">
+                    <a:shade val="50000"/>
+                  </a:schemeClr>
+                </a:lnRef>
+                <a:fillRef idx="1">
+                  <a:schemeClr val="accent1"/>
+                </a:fillRef>
+                <a:effectRef idx="0">
+                  <a:schemeClr val="accent1"/>
+                </a:effectRef>
+                <a:fontRef idx="minor">
+                  <a:schemeClr val="lt1"/>
+                </a:fontRef>
+              </p:style>
+              <p:txBody>
+                <a:bodyPr rtlCol="0" anchor="ctr"/>
+                <a:lstStyle/>
+                <a:p>
+                  <a:pPr algn="ctr"/>
+                  <a:endParaRPr lang="en-CA" dirty="0"/>
+                </a:p>
+              </p:txBody>
+            </p:sp>
+            <p:sp>
+              <p:nvSpPr>
+                <p:cNvPr id="74" name="Oval 73">
+                  <a:extLst>
+                    <a:ext uri="{FF2B5EF4-FFF2-40B4-BE49-F238E27FC236}">
+                      <a16:creationId xmlns:a16="http://schemas.microsoft.com/office/drawing/2014/main" id="{F6BFE538-BEFC-4E25-A41A-05912713D86D}"/>
+                    </a:ext>
+                  </a:extLst>
+                </p:cNvPr>
+                <p:cNvSpPr/>
+                <p:nvPr/>
+              </p:nvSpPr>
+              <p:spPr>
+                <a:xfrm>
+                  <a:off x="4798013" y="2484615"/>
+                  <a:ext cx="450937" cy="450937"/>
+                </a:xfrm>
+                <a:prstGeom prst="ellipse">
+                  <a:avLst/>
+                </a:prstGeom>
+                <a:solidFill>
+                  <a:schemeClr val="bg1"/>
+                </a:solidFill>
+              </p:spPr>
+              <p:style>
+                <a:lnRef idx="2">
+                  <a:schemeClr val="accent1">
+                    <a:shade val="50000"/>
+                  </a:schemeClr>
+                </a:lnRef>
+                <a:fillRef idx="1">
+                  <a:schemeClr val="accent1"/>
+                </a:fillRef>
+                <a:effectRef idx="0">
+                  <a:schemeClr val="accent1"/>
+                </a:effectRef>
+                <a:fontRef idx="minor">
+                  <a:schemeClr val="lt1"/>
+                </a:fontRef>
+              </p:style>
+              <p:txBody>
+                <a:bodyPr rtlCol="0" anchor="ctr"/>
+                <a:lstStyle/>
+                <a:p>
+                  <a:pPr algn="ctr"/>
+                  <a:endParaRPr lang="en-CA" dirty="0"/>
+                </a:p>
+              </p:txBody>
+            </p:sp>
+            <p:sp>
+              <p:nvSpPr>
+                <p:cNvPr id="75" name="Oval 74">
+                  <a:extLst>
+                    <a:ext uri="{FF2B5EF4-FFF2-40B4-BE49-F238E27FC236}">
+                      <a16:creationId xmlns:a16="http://schemas.microsoft.com/office/drawing/2014/main" id="{BB3E202F-AADD-4478-B378-6EE26FBF7782}"/>
+                    </a:ext>
+                  </a:extLst>
+                </p:cNvPr>
+                <p:cNvSpPr/>
+                <p:nvPr/>
+              </p:nvSpPr>
+              <p:spPr>
+                <a:xfrm>
+                  <a:off x="5377144" y="2484616"/>
+                  <a:ext cx="450937" cy="450937"/>
+                </a:xfrm>
+                <a:prstGeom prst="ellipse">
+                  <a:avLst/>
+                </a:prstGeom>
+                <a:solidFill>
+                  <a:schemeClr val="bg1"/>
+                </a:solidFill>
+              </p:spPr>
+              <p:style>
+                <a:lnRef idx="2">
+                  <a:schemeClr val="accent1">
+                    <a:shade val="50000"/>
+                  </a:schemeClr>
+                </a:lnRef>
+                <a:fillRef idx="1">
+                  <a:schemeClr val="accent1"/>
+                </a:fillRef>
+                <a:effectRef idx="0">
+                  <a:schemeClr val="accent1"/>
+                </a:effectRef>
+                <a:fontRef idx="minor">
+                  <a:schemeClr val="lt1"/>
+                </a:fontRef>
+              </p:style>
+              <p:txBody>
+                <a:bodyPr rtlCol="0" anchor="ctr"/>
+                <a:lstStyle/>
+                <a:p>
+                  <a:pPr algn="ctr"/>
+                  <a:endParaRPr lang="en-CA" dirty="0"/>
+                </a:p>
+              </p:txBody>
+            </p:sp>
+            <p:sp>
+              <p:nvSpPr>
+                <p:cNvPr id="76" name="Oval 75">
+                  <a:extLst>
+                    <a:ext uri="{FF2B5EF4-FFF2-40B4-BE49-F238E27FC236}">
+                      <a16:creationId xmlns:a16="http://schemas.microsoft.com/office/drawing/2014/main" id="{93AA38D2-C86F-4B41-B559-D514231D5859}"/>
+                    </a:ext>
+                  </a:extLst>
+                </p:cNvPr>
+                <p:cNvSpPr/>
+                <p:nvPr/>
+              </p:nvSpPr>
+              <p:spPr>
+                <a:xfrm>
+                  <a:off x="6007295" y="2484614"/>
+                  <a:ext cx="450937" cy="450937"/>
+                </a:xfrm>
+                <a:prstGeom prst="ellipse">
+                  <a:avLst/>
+                </a:prstGeom>
+                <a:solidFill>
+                  <a:schemeClr val="bg1"/>
+                </a:solidFill>
+              </p:spPr>
+              <p:style>
+                <a:lnRef idx="2">
+                  <a:schemeClr val="accent1">
+                    <a:shade val="50000"/>
+                  </a:schemeClr>
+                </a:lnRef>
+                <a:fillRef idx="1">
+                  <a:schemeClr val="accent1"/>
+                </a:fillRef>
+                <a:effectRef idx="0">
+                  <a:schemeClr val="accent1"/>
+                </a:effectRef>
+                <a:fontRef idx="minor">
+                  <a:schemeClr val="lt1"/>
+                </a:fontRef>
+              </p:style>
+              <p:txBody>
+                <a:bodyPr rtlCol="0" anchor="ctr"/>
+                <a:lstStyle/>
+                <a:p>
+                  <a:pPr algn="ctr"/>
+                  <a:endParaRPr lang="en-CA" dirty="0"/>
+                </a:p>
+              </p:txBody>
+            </p:sp>
+            <p:sp>
+              <p:nvSpPr>
+                <p:cNvPr id="77" name="Oval 76">
+                  <a:extLst>
+                    <a:ext uri="{FF2B5EF4-FFF2-40B4-BE49-F238E27FC236}">
+                      <a16:creationId xmlns:a16="http://schemas.microsoft.com/office/drawing/2014/main" id="{A165864B-06FF-4716-97DC-B7B6BCAA1273}"/>
+                    </a:ext>
+                  </a:extLst>
+                </p:cNvPr>
+                <p:cNvSpPr/>
+                <p:nvPr/>
+              </p:nvSpPr>
+              <p:spPr>
+                <a:xfrm>
+                  <a:off x="6668366" y="2482812"/>
+                  <a:ext cx="450937" cy="450937"/>
+                </a:xfrm>
+                <a:prstGeom prst="ellipse">
+                  <a:avLst/>
+                </a:prstGeom>
+                <a:solidFill>
+                  <a:schemeClr val="bg1"/>
+                </a:solidFill>
+              </p:spPr>
+              <p:style>
+                <a:lnRef idx="2">
+                  <a:schemeClr val="accent1">
+                    <a:shade val="50000"/>
+                  </a:schemeClr>
+                </a:lnRef>
+                <a:fillRef idx="1">
+                  <a:schemeClr val="accent1"/>
+                </a:fillRef>
+                <a:effectRef idx="0">
+                  <a:schemeClr val="accent1"/>
+                </a:effectRef>
+                <a:fontRef idx="minor">
+                  <a:schemeClr val="lt1"/>
+                </a:fontRef>
+              </p:style>
+              <p:txBody>
+                <a:bodyPr rtlCol="0" anchor="ctr"/>
+                <a:lstStyle/>
+                <a:p>
+                  <a:pPr algn="ctr"/>
+                  <a:endParaRPr lang="en-CA" dirty="0"/>
+                </a:p>
+              </p:txBody>
+            </p:sp>
+            <p:sp>
+              <p:nvSpPr>
+                <p:cNvPr id="78" name="Oval 77">
+                  <a:extLst>
+                    <a:ext uri="{FF2B5EF4-FFF2-40B4-BE49-F238E27FC236}">
+                      <a16:creationId xmlns:a16="http://schemas.microsoft.com/office/drawing/2014/main" id="{20DECC42-2686-408F-8FB1-1555494844F8}"/>
+                    </a:ext>
+                  </a:extLst>
+                </p:cNvPr>
+                <p:cNvSpPr/>
+                <p:nvPr/>
+              </p:nvSpPr>
+              <p:spPr>
+                <a:xfrm>
+                  <a:off x="7280403" y="2490483"/>
+                  <a:ext cx="450937" cy="450937"/>
+                </a:xfrm>
+                <a:prstGeom prst="ellipse">
+                  <a:avLst/>
+                </a:prstGeom>
+                <a:solidFill>
+                  <a:schemeClr val="bg1"/>
+                </a:solidFill>
+              </p:spPr>
+              <p:style>
+                <a:lnRef idx="2">
+                  <a:schemeClr val="accent1">
+                    <a:shade val="50000"/>
+                  </a:schemeClr>
+                </a:lnRef>
+                <a:fillRef idx="1">
+                  <a:schemeClr val="accent1"/>
+                </a:fillRef>
+                <a:effectRef idx="0">
+                  <a:schemeClr val="accent1"/>
+                </a:effectRef>
+                <a:fontRef idx="minor">
+                  <a:schemeClr val="lt1"/>
+                </a:fontRef>
+              </p:style>
+              <p:txBody>
+                <a:bodyPr rtlCol="0" anchor="ctr"/>
+                <a:lstStyle/>
+                <a:p>
+                  <a:pPr algn="ctr"/>
+                  <a:endParaRPr lang="en-CA"/>
+                </a:p>
+              </p:txBody>
+            </p:sp>
+          </p:grpSp>
+          <p:grpSp>
+            <p:nvGrpSpPr>
+              <p:cNvPr id="64" name="Group 63">
+                <a:extLst>
+                  <a:ext uri="{FF2B5EF4-FFF2-40B4-BE49-F238E27FC236}">
+                    <a16:creationId xmlns:a16="http://schemas.microsoft.com/office/drawing/2014/main" id="{6ACC6B8A-C301-4901-BA83-5CB732C949BA}"/>
+                  </a:ext>
+                </a:extLst>
+              </p:cNvPr>
+              <p:cNvGrpSpPr/>
+              <p:nvPr/>
+            </p:nvGrpSpPr>
+            <p:grpSpPr>
+              <a:xfrm>
+                <a:off x="3567741" y="5398631"/>
+                <a:ext cx="4175515" cy="458608"/>
+                <a:chOff x="3555825" y="2482812"/>
+                <a:chExt cx="4175515" cy="458608"/>
+              </a:xfrm>
+            </p:grpSpPr>
+            <p:sp>
+              <p:nvSpPr>
+                <p:cNvPr id="65" name="Oval 64">
+                  <a:extLst>
+                    <a:ext uri="{FF2B5EF4-FFF2-40B4-BE49-F238E27FC236}">
+                      <a16:creationId xmlns:a16="http://schemas.microsoft.com/office/drawing/2014/main" id="{FF3CFEB6-7748-4A56-9016-B6D170E9DB32}"/>
+                    </a:ext>
+                  </a:extLst>
+                </p:cNvPr>
+                <p:cNvSpPr/>
+                <p:nvPr/>
+              </p:nvSpPr>
+              <p:spPr>
+                <a:xfrm>
+                  <a:off x="3555825" y="2484619"/>
+                  <a:ext cx="450937" cy="450937"/>
+                </a:xfrm>
+                <a:prstGeom prst="ellipse">
+                  <a:avLst/>
+                </a:prstGeom>
+                <a:solidFill>
+                  <a:schemeClr val="bg1"/>
+                </a:solidFill>
+              </p:spPr>
+              <p:style>
+                <a:lnRef idx="2">
+                  <a:schemeClr val="accent1">
+                    <a:shade val="50000"/>
+                  </a:schemeClr>
+                </a:lnRef>
+                <a:fillRef idx="1">
+                  <a:schemeClr val="accent1"/>
+                </a:fillRef>
+                <a:effectRef idx="0">
+                  <a:schemeClr val="accent1"/>
+                </a:effectRef>
+                <a:fontRef idx="minor">
+                  <a:schemeClr val="lt1"/>
+                </a:fontRef>
+              </p:style>
+              <p:txBody>
+                <a:bodyPr rtlCol="0" anchor="ctr"/>
+                <a:lstStyle/>
+                <a:p>
+                  <a:pPr algn="ctr"/>
+                  <a:endParaRPr lang="en-CA"/>
+                </a:p>
+              </p:txBody>
+            </p:sp>
+            <p:sp>
+              <p:nvSpPr>
+                <p:cNvPr id="66" name="Oval 65">
+                  <a:extLst>
+                    <a:ext uri="{FF2B5EF4-FFF2-40B4-BE49-F238E27FC236}">
+                      <a16:creationId xmlns:a16="http://schemas.microsoft.com/office/drawing/2014/main" id="{B4775F6B-C048-45A5-87B2-06E70AE143DB}"/>
+                    </a:ext>
+                  </a:extLst>
+                </p:cNvPr>
+                <p:cNvSpPr/>
+                <p:nvPr/>
+              </p:nvSpPr>
+              <p:spPr>
+                <a:xfrm>
+                  <a:off x="4167862" y="2484615"/>
+                  <a:ext cx="450937" cy="450937"/>
+                </a:xfrm>
+                <a:prstGeom prst="ellipse">
+                  <a:avLst/>
+                </a:prstGeom>
+                <a:solidFill>
+                  <a:schemeClr val="bg1"/>
+                </a:solidFill>
+              </p:spPr>
+              <p:style>
+                <a:lnRef idx="2">
+                  <a:schemeClr val="accent1">
+                    <a:shade val="50000"/>
+                  </a:schemeClr>
+                </a:lnRef>
+                <a:fillRef idx="1">
+                  <a:schemeClr val="accent1"/>
+                </a:fillRef>
+                <a:effectRef idx="0">
+                  <a:schemeClr val="accent1"/>
+                </a:effectRef>
+                <a:fontRef idx="minor">
+                  <a:schemeClr val="lt1"/>
+                </a:fontRef>
+              </p:style>
+              <p:txBody>
+                <a:bodyPr rtlCol="0" anchor="ctr"/>
+                <a:lstStyle/>
+                <a:p>
+                  <a:pPr algn="ctr"/>
+                  <a:endParaRPr lang="en-CA" dirty="0"/>
+                </a:p>
+              </p:txBody>
+            </p:sp>
+            <p:sp>
+              <p:nvSpPr>
+                <p:cNvPr id="67" name="Oval 66">
+                  <a:extLst>
+                    <a:ext uri="{FF2B5EF4-FFF2-40B4-BE49-F238E27FC236}">
+                      <a16:creationId xmlns:a16="http://schemas.microsoft.com/office/drawing/2014/main" id="{80620DD0-2892-4CE0-A1B7-3BE50D463C0E}"/>
+                    </a:ext>
+                  </a:extLst>
+                </p:cNvPr>
+                <p:cNvSpPr/>
+                <p:nvPr/>
+              </p:nvSpPr>
+              <p:spPr>
+                <a:xfrm>
+                  <a:off x="4798013" y="2484615"/>
+                  <a:ext cx="450937" cy="450937"/>
+                </a:xfrm>
+                <a:prstGeom prst="ellipse">
+                  <a:avLst/>
+                </a:prstGeom>
+                <a:solidFill>
+                  <a:schemeClr val="bg1"/>
+                </a:solidFill>
+              </p:spPr>
+              <p:style>
+                <a:lnRef idx="2">
+                  <a:schemeClr val="accent1">
+                    <a:shade val="50000"/>
+                  </a:schemeClr>
+                </a:lnRef>
+                <a:fillRef idx="1">
+                  <a:schemeClr val="accent1"/>
+                </a:fillRef>
+                <a:effectRef idx="0">
+                  <a:schemeClr val="accent1"/>
+                </a:effectRef>
+                <a:fontRef idx="minor">
+                  <a:schemeClr val="lt1"/>
+                </a:fontRef>
+              </p:style>
+              <p:txBody>
+                <a:bodyPr rtlCol="0" anchor="ctr"/>
+                <a:lstStyle/>
+                <a:p>
+                  <a:pPr algn="ctr"/>
+                  <a:endParaRPr lang="en-CA" dirty="0"/>
+                </a:p>
+              </p:txBody>
+            </p:sp>
+            <p:sp>
+              <p:nvSpPr>
+                <p:cNvPr id="68" name="Oval 67">
+                  <a:extLst>
+                    <a:ext uri="{FF2B5EF4-FFF2-40B4-BE49-F238E27FC236}">
+                      <a16:creationId xmlns:a16="http://schemas.microsoft.com/office/drawing/2014/main" id="{E2474A12-B290-4712-97CF-1C66CB92BAB6}"/>
+                    </a:ext>
+                  </a:extLst>
+                </p:cNvPr>
+                <p:cNvSpPr/>
+                <p:nvPr/>
+              </p:nvSpPr>
+              <p:spPr>
+                <a:xfrm>
+                  <a:off x="5377144" y="2484616"/>
+                  <a:ext cx="450937" cy="450937"/>
+                </a:xfrm>
+                <a:prstGeom prst="ellipse">
+                  <a:avLst/>
+                </a:prstGeom>
+                <a:solidFill>
+                  <a:schemeClr val="bg1"/>
+                </a:solidFill>
+              </p:spPr>
+              <p:style>
+                <a:lnRef idx="2">
+                  <a:schemeClr val="accent1">
+                    <a:shade val="50000"/>
+                  </a:schemeClr>
+                </a:lnRef>
+                <a:fillRef idx="1">
+                  <a:schemeClr val="accent1"/>
+                </a:fillRef>
+                <a:effectRef idx="0">
+                  <a:schemeClr val="accent1"/>
+                </a:effectRef>
+                <a:fontRef idx="minor">
+                  <a:schemeClr val="lt1"/>
+                </a:fontRef>
+              </p:style>
+              <p:txBody>
+                <a:bodyPr rtlCol="0" anchor="ctr"/>
+                <a:lstStyle/>
+                <a:p>
+                  <a:pPr algn="ctr"/>
+                  <a:endParaRPr lang="en-CA" dirty="0"/>
+                </a:p>
+              </p:txBody>
+            </p:sp>
+            <p:sp>
+              <p:nvSpPr>
+                <p:cNvPr id="69" name="Oval 68">
+                  <a:extLst>
+                    <a:ext uri="{FF2B5EF4-FFF2-40B4-BE49-F238E27FC236}">
+                      <a16:creationId xmlns:a16="http://schemas.microsoft.com/office/drawing/2014/main" id="{658577BE-AA67-48F9-9EC5-3149E7958A40}"/>
+                    </a:ext>
+                  </a:extLst>
+                </p:cNvPr>
+                <p:cNvSpPr/>
+                <p:nvPr/>
+              </p:nvSpPr>
+              <p:spPr>
+                <a:xfrm>
+                  <a:off x="6007295" y="2484614"/>
+                  <a:ext cx="450937" cy="450937"/>
+                </a:xfrm>
+                <a:prstGeom prst="ellipse">
+                  <a:avLst/>
+                </a:prstGeom>
+                <a:solidFill>
+                  <a:schemeClr val="bg1"/>
+                </a:solidFill>
+              </p:spPr>
+              <p:style>
+                <a:lnRef idx="2">
+                  <a:schemeClr val="accent1">
+                    <a:shade val="50000"/>
+                  </a:schemeClr>
+                </a:lnRef>
+                <a:fillRef idx="1">
+                  <a:schemeClr val="accent1"/>
+                </a:fillRef>
+                <a:effectRef idx="0">
+                  <a:schemeClr val="accent1"/>
+                </a:effectRef>
+                <a:fontRef idx="minor">
+                  <a:schemeClr val="lt1"/>
+                </a:fontRef>
+              </p:style>
+              <p:txBody>
+                <a:bodyPr rtlCol="0" anchor="ctr"/>
+                <a:lstStyle/>
+                <a:p>
+                  <a:pPr algn="ctr"/>
+                  <a:endParaRPr lang="en-CA" dirty="0"/>
+                </a:p>
+              </p:txBody>
+            </p:sp>
+            <p:sp>
+              <p:nvSpPr>
+                <p:cNvPr id="70" name="Oval 69">
+                  <a:extLst>
+                    <a:ext uri="{FF2B5EF4-FFF2-40B4-BE49-F238E27FC236}">
+                      <a16:creationId xmlns:a16="http://schemas.microsoft.com/office/drawing/2014/main" id="{D0BAE185-DDFD-4214-9CA8-42FA0978491E}"/>
+                    </a:ext>
+                  </a:extLst>
+                </p:cNvPr>
+                <p:cNvSpPr/>
+                <p:nvPr/>
+              </p:nvSpPr>
+              <p:spPr>
+                <a:xfrm>
+                  <a:off x="6668366" y="2482812"/>
+                  <a:ext cx="450937" cy="450937"/>
+                </a:xfrm>
+                <a:prstGeom prst="ellipse">
+                  <a:avLst/>
+                </a:prstGeom>
+                <a:solidFill>
+                  <a:schemeClr val="bg1"/>
+                </a:solidFill>
+              </p:spPr>
+              <p:style>
+                <a:lnRef idx="2">
+                  <a:schemeClr val="accent1">
+                    <a:shade val="50000"/>
+                  </a:schemeClr>
+                </a:lnRef>
+                <a:fillRef idx="1">
+                  <a:schemeClr val="accent1"/>
+                </a:fillRef>
+                <a:effectRef idx="0">
+                  <a:schemeClr val="accent1"/>
+                </a:effectRef>
+                <a:fontRef idx="minor">
+                  <a:schemeClr val="lt1"/>
+                </a:fontRef>
+              </p:style>
+              <p:txBody>
+                <a:bodyPr rtlCol="0" anchor="ctr"/>
+                <a:lstStyle/>
+                <a:p>
+                  <a:pPr algn="ctr"/>
+                  <a:endParaRPr lang="en-CA" dirty="0"/>
+                </a:p>
+              </p:txBody>
+            </p:sp>
+            <p:sp>
+              <p:nvSpPr>
+                <p:cNvPr id="71" name="Oval 70">
+                  <a:extLst>
+                    <a:ext uri="{FF2B5EF4-FFF2-40B4-BE49-F238E27FC236}">
+                      <a16:creationId xmlns:a16="http://schemas.microsoft.com/office/drawing/2014/main" id="{418C8C49-8673-49AB-B266-1906EF9D22F9}"/>
+                    </a:ext>
+                  </a:extLst>
+                </p:cNvPr>
+                <p:cNvSpPr/>
+                <p:nvPr/>
+              </p:nvSpPr>
+              <p:spPr>
+                <a:xfrm>
+                  <a:off x="7280403" y="2490483"/>
+                  <a:ext cx="450937" cy="450937"/>
+                </a:xfrm>
+                <a:prstGeom prst="ellipse">
+                  <a:avLst/>
+                </a:prstGeom>
+                <a:solidFill>
+                  <a:schemeClr val="bg1"/>
+                </a:solidFill>
+              </p:spPr>
+              <p:style>
+                <a:lnRef idx="2">
+                  <a:schemeClr val="accent1">
+                    <a:shade val="50000"/>
+                  </a:schemeClr>
+                </a:lnRef>
+                <a:fillRef idx="1">
+                  <a:schemeClr val="accent1"/>
+                </a:fillRef>
+                <a:effectRef idx="0">
+                  <a:schemeClr val="accent1"/>
+                </a:effectRef>
+                <a:fontRef idx="minor">
+                  <a:schemeClr val="lt1"/>
+                </a:fontRef>
+              </p:style>
+              <p:txBody>
+                <a:bodyPr rtlCol="0" anchor="ctr"/>
+                <a:lstStyle/>
+                <a:p>
+                  <a:pPr algn="ctr"/>
+                  <a:endParaRPr lang="en-CA"/>
+                </a:p>
+              </p:txBody>
+            </p:sp>
+          </p:grpSp>
+        </p:grpSp>
+        <p:sp>
+          <p:nvSpPr>
+            <p:cNvPr id="56" name="Oval 55">
+              <a:extLst>
+                <a:ext uri="{FF2B5EF4-FFF2-40B4-BE49-F238E27FC236}">
+                  <a16:creationId xmlns:a16="http://schemas.microsoft.com/office/drawing/2014/main" id="{9BE5B500-0270-4696-9900-397040DB61FD}"/>
+                </a:ext>
+              </a:extLst>
+            </p:cNvPr>
+            <p:cNvSpPr/>
+            <p:nvPr/>
+          </p:nvSpPr>
+          <p:spPr>
+            <a:xfrm>
+              <a:off x="6821373" y="4617402"/>
+              <a:ext cx="433792" cy="433792"/>
+            </a:xfrm>
+            <a:prstGeom prst="ellipse">
+              <a:avLst/>
+            </a:prstGeom>
+            <a:solidFill>
+              <a:srgbClr val="FF0000"/>
+            </a:solidFill>
+          </p:spPr>
+          <p:style>
+            <a:lnRef idx="2">
+              <a:schemeClr val="accent1">
+                <a:shade val="50000"/>
+              </a:schemeClr>
+            </a:lnRef>
+            <a:fillRef idx="1">
+              <a:schemeClr val="accent1"/>
+            </a:fillRef>
+            <a:effectRef idx="0">
+              <a:schemeClr val="accent1"/>
+            </a:effectRef>
+            <a:fontRef idx="minor">
+              <a:schemeClr val="lt1"/>
+            </a:fontRef>
+          </p:style>
+          <p:txBody>
+            <a:bodyPr rtlCol="0" anchor="ctr"/>
+            <a:lstStyle/>
+            <a:p>
+              <a:pPr algn="ctr"/>
+              <a:endParaRPr lang="en-CA" dirty="0"/>
+            </a:p>
+          </p:txBody>
+        </p:sp>
+        <p:pic>
+          <p:nvPicPr>
+            <p:cNvPr id="57" name="Picture 2" descr="Image result for pointer cursor">
+              <a:extLst>
+                <a:ext uri="{FF2B5EF4-FFF2-40B4-BE49-F238E27FC236}">
+                  <a16:creationId xmlns:a16="http://schemas.microsoft.com/office/drawing/2014/main" id="{2149B1E0-B936-4C1D-BFB6-35E417ABEADD}"/>
+                </a:ext>
+              </a:extLst>
+            </p:cNvPr>
+            <p:cNvPicPr>
+              <a:picLocks noChangeAspect="1" noChangeArrowheads="1"/>
+            </p:cNvPicPr>
+            <p:nvPr/>
+          </p:nvPicPr>
+          <p:blipFill>
+            <a:blip r:embed="rId3">
+              <a:extLst>
+                <a:ext uri="{28A0092B-C50C-407E-A947-70E740481C1C}">
+                  <a14:useLocalDpi xmlns:a14="http://schemas.microsoft.com/office/drawing/2010/main" val="0"/>
+                </a:ext>
+              </a:extLst>
+            </a:blip>
+            <a:srcRect/>
+            <a:stretch>
+              <a:fillRect/>
+            </a:stretch>
+          </p:blipFill>
+          <p:spPr bwMode="auto">
+            <a:xfrm>
+              <a:off x="6809910" y="1189392"/>
+              <a:ext cx="418578" cy="418578"/>
+            </a:xfrm>
+            <a:prstGeom prst="rect">
+              <a:avLst/>
+            </a:prstGeom>
+            <a:noFill/>
+            <a:extLst>
+              <a:ext uri="{909E8E84-426E-40DD-AFC4-6F175D3DCCD1}">
+                <a14:hiddenFill xmlns:a14="http://schemas.microsoft.com/office/drawing/2010/main">
+                  <a:solidFill>
+                    <a:srgbClr val="FFFFFF"/>
+                  </a:solidFill>
+                </a14:hiddenFill>
+              </a:ext>
+            </a:extLst>
+          </p:spPr>
+        </p:pic>
+      </p:grpSp>
+    </p:spTree>
+    <p:extLst>
+      <p:ext uri="{BB962C8B-B14F-4D97-AF65-F5344CB8AC3E}">
+        <p14:creationId xmlns:p14="http://schemas.microsoft.com/office/powerpoint/2010/main" val="3640284129"/>
+      </p:ext>
+    </p:extLst>
+  </p:cSld>
+  <p:clrMapOvr>
+    <a:masterClrMapping/>
+  </p:clrMapOvr>
+</p:sld>
+</file>
+
+<file path=ppt/slides/slide3.xml><?xml version="1.0" encoding="utf-8"?>
+<p:sld xmlns:a="http://schemas.openxmlformats.org/drawingml/2006/main" xmlns:r="http://schemas.openxmlformats.org/officeDocument/2006/relationships" xmlns:p="http://schemas.openxmlformats.org/presentationml/2006/main">
+  <p:cSld>
+    <p:spTree>
+      <p:nvGrpSpPr>
+        <p:cNvPr id="1" name=""/>
+        <p:cNvGrpSpPr/>
+        <p:nvPr/>
+      </p:nvGrpSpPr>
+      <p:grpSpPr>
+        <a:xfrm>
+          <a:off x="0" y="0"/>
+          <a:ext cx="0" cy="0"/>
+          <a:chOff x="0" y="0"/>
+          <a:chExt cx="0" cy="0"/>
+        </a:xfrm>
+      </p:grpSpPr>
+      <p:sp>
+        <p:nvSpPr>
+          <p:cNvPr id="2" name="Title 1">
+            <a:extLst>
+              <a:ext uri="{FF2B5EF4-FFF2-40B4-BE49-F238E27FC236}">
+                <a16:creationId xmlns:a16="http://schemas.microsoft.com/office/drawing/2014/main" id="{0DD0F053-0211-4356-87B2-E9A0BC51074E}"/>
               </a:ext>
             </a:extLst>
           </p:cNvPr>
@@ -4231,7 +7106,7 @@
           <a:p>
             <a:r>
               <a:rPr lang="en-US" dirty="0"/>
-              <a:t>Game Features</a:t>
+              <a:t>GUI Components</a:t>
             </a:r>
             <a:endParaRPr lang="en-CA" dirty="0"/>
           </a:p>
@@ -4242,7 +7117,7 @@
           <p:cNvPr id="3" name="Content Placeholder 2">
             <a:extLst>
               <a:ext uri="{FF2B5EF4-FFF2-40B4-BE49-F238E27FC236}">
-                <a16:creationId xmlns:a16="http://schemas.microsoft.com/office/drawing/2014/main" id="{43B578CC-96CA-4A7E-9201-CED917AD2DA0}"/>
+                <a16:creationId xmlns:a16="http://schemas.microsoft.com/office/drawing/2014/main" id="{AC5C79FF-5D92-42BB-A6F9-C4850BBDD67E}"/>
               </a:ext>
             </a:extLst>
           </p:cNvPr>
@@ -4255,8 +7130,8 @@
         </p:nvSpPr>
         <p:spPr>
           <a:xfrm>
-            <a:off x="838200" y="1690688"/>
-            <a:ext cx="10515600" cy="4703849"/>
+            <a:off x="838200" y="1406003"/>
+            <a:ext cx="10515600" cy="4863274"/>
           </a:xfrm>
         </p:spPr>
         <p:txBody>
@@ -4266,33 +7141,92 @@
           <a:lstStyle/>
           <a:p>
             <a:r>
+              <a:rPr lang="en-US" dirty="0" err="1"/>
+              <a:t>Pygame</a:t>
+            </a:r>
+            <a:r>
               <a:rPr lang="en-US" dirty="0"/>
-              <a:t>Objects</a:t>
+              <a:t> display surface represents the only screen of the game.</a:t>
+            </a:r>
+          </a:p>
+          <a:p>
+            <a:r>
+              <a:rPr lang="en-US" dirty="0"/>
+              <a:t>Display Surface</a:t>
             </a:r>
           </a:p>
           <a:p>
             <a:pPr lvl="1"/>
             <a:r>
               <a:rPr lang="en-US" dirty="0"/>
-              <a:t>Disks</a:t>
+              <a:t>Display Surface Major Update 1 – Start View</a:t>
             </a:r>
           </a:p>
           <a:p>
             <a:pPr lvl="2"/>
             <a:r>
               <a:rPr lang="en-US" dirty="0"/>
-              <a:t>Player 1 – red</a:t>
+              <a:t>Start, Help, Exit and Close Window Button</a:t>
             </a:r>
           </a:p>
           <a:p>
             <a:pPr lvl="2"/>
             <a:r>
               <a:rPr lang="en-US" dirty="0"/>
-              <a:t>Player 2 - yellow</a:t>
+              <a:t>Text Fields</a:t>
+            </a:r>
+          </a:p>
+          <a:p>
+            <a:pPr lvl="2"/>
+            <a:r>
+              <a:rPr lang="en-US" dirty="0"/>
+              <a:t>Few updates</a:t>
             </a:r>
           </a:p>
           <a:p>
             <a:pPr lvl="1"/>
+            <a:r>
+              <a:rPr lang="en-US" dirty="0"/>
+              <a:t>Display Surface Major Update 2 – Help View</a:t>
+            </a:r>
+          </a:p>
+          <a:p>
+            <a:pPr lvl="2"/>
+            <a:r>
+              <a:rPr lang="en-US" dirty="0"/>
+              <a:t>Start, Exit and Close Window Button</a:t>
+            </a:r>
+          </a:p>
+          <a:p>
+            <a:pPr lvl="2"/>
+            <a:r>
+              <a:rPr lang="en-US" dirty="0"/>
+              <a:t>Text Fields</a:t>
+            </a:r>
+          </a:p>
+          <a:p>
+            <a:pPr lvl="2"/>
+            <a:r>
+              <a:rPr lang="en-US" dirty="0"/>
+              <a:t>Few updates</a:t>
+            </a:r>
+          </a:p>
+          <a:p>
+            <a:pPr lvl="1"/>
+            <a:r>
+              <a:rPr lang="en-US" dirty="0"/>
+              <a:t>Display Surface Major Update 3 – Play View</a:t>
+            </a:r>
+          </a:p>
+          <a:p>
+            <a:pPr lvl="2"/>
+            <a:r>
+              <a:rPr lang="en-US" dirty="0"/>
+              <a:t>Help, Exit and Close Window Button</a:t>
+            </a:r>
+          </a:p>
+          <a:p>
+            <a:pPr lvl="2"/>
             <a:r>
               <a:rPr lang="en-US" dirty="0"/>
               <a:t>Board</a:t>
@@ -4302,84 +7236,45 @@
             <a:pPr lvl="2"/>
             <a:r>
               <a:rPr lang="en-US" dirty="0"/>
-              <a:t>Width – 7 slots</a:t>
+              <a:t>Text Fields</a:t>
             </a:r>
           </a:p>
           <a:p>
             <a:pPr lvl="2"/>
             <a:r>
               <a:rPr lang="en-US" dirty="0"/>
-              <a:t>Height – 6 slots</a:t>
+              <a:t>Multiple updates</a:t>
             </a:r>
           </a:p>
           <a:p>
             <a:pPr lvl="1"/>
             <a:r>
               <a:rPr lang="en-US" dirty="0"/>
-              <a:t>Start Button</a:t>
-            </a:r>
-          </a:p>
-          <a:p>
-            <a:pPr lvl="1"/>
+              <a:t>Display Surface Major Update 4 – End View</a:t>
+            </a:r>
+          </a:p>
+          <a:p>
+            <a:pPr lvl="2"/>
             <a:r>
               <a:rPr lang="en-US" dirty="0"/>
-              <a:t>Play Again Button</a:t>
-            </a:r>
-          </a:p>
-          <a:p>
-            <a:pPr lvl="1"/>
+              <a:t>Play Again, Help and Close Window Button</a:t>
+            </a:r>
+          </a:p>
+          <a:p>
+            <a:pPr lvl="2"/>
             <a:r>
               <a:rPr lang="en-US" dirty="0"/>
-              <a:t>Help Button</a:t>
-            </a:r>
-          </a:p>
-          <a:p>
-            <a:pPr lvl="1"/>
+              <a:t>Text Fields</a:t>
+            </a:r>
+          </a:p>
+          <a:p>
+            <a:pPr lvl="2"/>
             <a:r>
               <a:rPr lang="en-US" dirty="0"/>
-              <a:t>Exit Button</a:t>
-            </a:r>
-          </a:p>
-          <a:p>
-            <a:pPr lvl="1"/>
-            <a:r>
-              <a:rPr lang="en-US" dirty="0"/>
-              <a:t>Close Window Button</a:t>
-            </a:r>
-          </a:p>
-          <a:p>
-            <a:r>
-              <a:rPr lang="en-US" dirty="0"/>
-              <a:t>Views</a:t>
-            </a:r>
-          </a:p>
-          <a:p>
-            <a:pPr lvl="1"/>
-            <a:r>
-              <a:rPr lang="en-US" dirty="0"/>
-              <a:t>Start View</a:t>
-            </a:r>
-          </a:p>
-          <a:p>
-            <a:pPr lvl="1"/>
-            <a:r>
-              <a:rPr lang="en-US" dirty="0"/>
-              <a:t>Help View</a:t>
-            </a:r>
-          </a:p>
-          <a:p>
-            <a:pPr lvl="1"/>
-            <a:r>
-              <a:rPr lang="en-US" dirty="0"/>
-              <a:t>Game Play View</a:t>
-            </a:r>
-          </a:p>
-          <a:p>
-            <a:pPr lvl="1"/>
-            <a:r>
-              <a:rPr lang="en-US" dirty="0"/>
-              <a:t>End View</a:t>
-            </a:r>
+              <a:t>Few updates</a:t>
+            </a:r>
+          </a:p>
+          <a:p>
             <a:endParaRPr lang="en-CA" dirty="0"/>
           </a:p>
         </p:txBody>
@@ -4387,7 +7282,7 @@
     </p:spTree>
     <p:extLst>
       <p:ext uri="{BB962C8B-B14F-4D97-AF65-F5344CB8AC3E}">
-        <p14:creationId xmlns:p14="http://schemas.microsoft.com/office/powerpoint/2010/main" val="1302352926"/>
+        <p14:creationId xmlns:p14="http://schemas.microsoft.com/office/powerpoint/2010/main" val="335759700"/>
       </p:ext>
     </p:extLst>
   </p:cSld>
@@ -4397,7 +7292,7 @@
 </p:sld>
 </file>
 
-<file path=ppt/slides/slide3.xml><?xml version="1.0" encoding="utf-8"?>
+<file path=ppt/slides/slide4.xml><?xml version="1.0" encoding="utf-8"?>
 <p:sld xmlns:a="http://schemas.openxmlformats.org/drawingml/2006/main" xmlns:r="http://schemas.openxmlformats.org/officeDocument/2006/relationships" xmlns:p="http://schemas.openxmlformats.org/presentationml/2006/main">
   <p:cSld>
     <p:spTree>
@@ -4936,7 +7831,7 @@
 </p:sld>
 </file>
 
-<file path=ppt/slides/slide4.xml><?xml version="1.0" encoding="utf-8"?>
+<file path=ppt/slides/slide5.xml><?xml version="1.0" encoding="utf-8"?>
 <p:sld xmlns:a="http://schemas.openxmlformats.org/drawingml/2006/main" xmlns:r="http://schemas.openxmlformats.org/officeDocument/2006/relationships" xmlns:p="http://schemas.openxmlformats.org/presentationml/2006/main">
   <p:cSld>
     <p:spTree>
@@ -5372,7 +8267,7 @@
 </p:sld>
 </file>
 
-<file path=ppt/slides/slide5.xml><?xml version="1.0" encoding="utf-8"?>
+<file path=ppt/slides/slide6.xml><?xml version="1.0" encoding="utf-8"?>
 <p:sld xmlns:a="http://schemas.openxmlformats.org/drawingml/2006/main" xmlns:r="http://schemas.openxmlformats.org/officeDocument/2006/relationships" xmlns:p="http://schemas.openxmlformats.org/presentationml/2006/main">
   <p:cSld>
     <p:spTree>
@@ -7924,176 +10819,6 @@
       </p:sp>
       <p:sp>
         <p:nvSpPr>
-          <p:cNvPr id="67" name="TextBox 66">
-            <a:extLst>
-              <a:ext uri="{FF2B5EF4-FFF2-40B4-BE49-F238E27FC236}">
-                <a16:creationId xmlns:a16="http://schemas.microsoft.com/office/drawing/2014/main" id="{ACFF01C6-8E83-4090-8588-1972887DEEB7}"/>
-              </a:ext>
-            </a:extLst>
-          </p:cNvPr>
-          <p:cNvSpPr txBox="1"/>
-          <p:nvPr/>
-        </p:nvSpPr>
-        <p:spPr>
-          <a:xfrm>
-            <a:off x="10520877" y="1152644"/>
-            <a:ext cx="1029071" cy="369332"/>
-          </a:xfrm>
-          <a:prstGeom prst="rect">
-            <a:avLst/>
-          </a:prstGeom>
-          <a:noFill/>
-        </p:spPr>
-        <p:txBody>
-          <a:bodyPr wrap="square" rtlCol="0">
-            <a:spAutoFit/>
-          </a:bodyPr>
-          <a:lstStyle/>
-          <a:p>
-            <a:r>
-              <a:rPr lang="en-US" dirty="0"/>
-              <a:t>Player 1</a:t>
-            </a:r>
-            <a:endParaRPr lang="en-CA" dirty="0"/>
-          </a:p>
-        </p:txBody>
-      </p:sp>
-      <p:sp>
-        <p:nvSpPr>
-          <p:cNvPr id="68" name="TextBox 67">
-            <a:extLst>
-              <a:ext uri="{FF2B5EF4-FFF2-40B4-BE49-F238E27FC236}">
-                <a16:creationId xmlns:a16="http://schemas.microsoft.com/office/drawing/2014/main" id="{286306C0-24BF-4546-A2B9-39CB26B1A10E}"/>
-              </a:ext>
-            </a:extLst>
-          </p:cNvPr>
-          <p:cNvSpPr txBox="1"/>
-          <p:nvPr/>
-        </p:nvSpPr>
-        <p:spPr>
-          <a:xfrm>
-            <a:off x="10530029" y="2646148"/>
-            <a:ext cx="1029071" cy="369332"/>
-          </a:xfrm>
-          <a:prstGeom prst="rect">
-            <a:avLst/>
-          </a:prstGeom>
-          <a:noFill/>
-        </p:spPr>
-        <p:txBody>
-          <a:bodyPr wrap="square" rtlCol="0">
-            <a:spAutoFit/>
-          </a:bodyPr>
-          <a:lstStyle/>
-          <a:p>
-            <a:r>
-              <a:rPr lang="en-US" dirty="0"/>
-              <a:t>Player 2</a:t>
-            </a:r>
-            <a:endParaRPr lang="en-CA" dirty="0"/>
-          </a:p>
-        </p:txBody>
-      </p:sp>
-      <p:sp>
-        <p:nvSpPr>
-          <p:cNvPr id="71" name="Oval 70">
-            <a:extLst>
-              <a:ext uri="{FF2B5EF4-FFF2-40B4-BE49-F238E27FC236}">
-                <a16:creationId xmlns:a16="http://schemas.microsoft.com/office/drawing/2014/main" id="{C4476AD4-1567-413A-B583-8B4365D6AD29}"/>
-              </a:ext>
-            </a:extLst>
-          </p:cNvPr>
-          <p:cNvSpPr/>
-          <p:nvPr/>
-        </p:nvSpPr>
-        <p:spPr>
-          <a:xfrm>
-            <a:off x="10806140" y="1664881"/>
-            <a:ext cx="433792" cy="433792"/>
-          </a:xfrm>
-          <a:prstGeom prst="ellipse">
-            <a:avLst/>
-          </a:prstGeom>
-          <a:solidFill>
-            <a:srgbClr val="FF0000"/>
-          </a:solidFill>
-        </p:spPr>
-        <p:style>
-          <a:lnRef idx="2">
-            <a:schemeClr val="accent1">
-              <a:shade val="50000"/>
-            </a:schemeClr>
-          </a:lnRef>
-          <a:fillRef idx="1">
-            <a:schemeClr val="accent1"/>
-          </a:fillRef>
-          <a:effectRef idx="0">
-            <a:schemeClr val="accent1"/>
-          </a:effectRef>
-          <a:fontRef idx="minor">
-            <a:schemeClr val="lt1"/>
-          </a:fontRef>
-        </p:style>
-        <p:txBody>
-          <a:bodyPr rtlCol="0" anchor="ctr"/>
-          <a:lstStyle/>
-          <a:p>
-            <a:pPr algn="ctr"/>
-            <a:endParaRPr lang="en-CA" dirty="0"/>
-          </a:p>
-        </p:txBody>
-      </p:sp>
-      <p:sp>
-        <p:nvSpPr>
-          <p:cNvPr id="72" name="Oval 71">
-            <a:extLst>
-              <a:ext uri="{FF2B5EF4-FFF2-40B4-BE49-F238E27FC236}">
-                <a16:creationId xmlns:a16="http://schemas.microsoft.com/office/drawing/2014/main" id="{EB0025B6-1F3E-4251-8D0F-D1290F37A1D8}"/>
-              </a:ext>
-            </a:extLst>
-          </p:cNvPr>
-          <p:cNvSpPr/>
-          <p:nvPr/>
-        </p:nvSpPr>
-        <p:spPr>
-          <a:xfrm>
-            <a:off x="10808133" y="3364345"/>
-            <a:ext cx="433792" cy="433792"/>
-          </a:xfrm>
-          <a:prstGeom prst="ellipse">
-            <a:avLst/>
-          </a:prstGeom>
-          <a:solidFill>
-            <a:srgbClr val="FFFF00"/>
-          </a:solidFill>
-        </p:spPr>
-        <p:style>
-          <a:lnRef idx="2">
-            <a:schemeClr val="accent1">
-              <a:shade val="50000"/>
-            </a:schemeClr>
-          </a:lnRef>
-          <a:fillRef idx="1">
-            <a:schemeClr val="accent1"/>
-          </a:fillRef>
-          <a:effectRef idx="0">
-            <a:schemeClr val="accent1"/>
-          </a:effectRef>
-          <a:fontRef idx="minor">
-            <a:schemeClr val="lt1"/>
-          </a:fontRef>
-        </p:style>
-        <p:txBody>
-          <a:bodyPr rtlCol="0" anchor="ctr"/>
-          <a:lstStyle/>
-          <a:p>
-            <a:pPr algn="ctr"/>
-            <a:endParaRPr lang="en-CA" dirty="0"/>
-          </a:p>
-        </p:txBody>
-      </p:sp>
-      <p:sp>
-        <p:nvSpPr>
           <p:cNvPr id="75" name="Oval 74">
             <a:extLst>
               <a:ext uri="{FF2B5EF4-FFF2-40B4-BE49-F238E27FC236}">
@@ -8205,7 +10930,7 @@
 </p:sld>
 </file>
 
-<file path=ppt/slides/slide6.xml><?xml version="1.0" encoding="utf-8"?>
+<file path=ppt/slides/slide7.xml><?xml version="1.0" encoding="utf-8"?>
 <p:sld xmlns:a="http://schemas.openxmlformats.org/drawingml/2006/main" xmlns:r="http://schemas.openxmlformats.org/officeDocument/2006/relationships" xmlns:p="http://schemas.openxmlformats.org/presentationml/2006/main">
   <p:cSld>
     <p:spTree>
@@ -8761,7 +11486,7 @@
 </p:sld>
 </file>
 
-<file path=ppt/slides/slide7.xml><?xml version="1.0" encoding="utf-8"?>
+<file path=ppt/slides/slide8.xml><?xml version="1.0" encoding="utf-8"?>
 <p:sld xmlns:a="http://schemas.openxmlformats.org/drawingml/2006/main" xmlns:r="http://schemas.openxmlformats.org/officeDocument/2006/relationships" xmlns:p="http://schemas.openxmlformats.org/presentationml/2006/main">
   <p:cSld>
     <p:spTree>
@@ -8825,10 +11550,146 @@
         </p:nvSpPr>
         <p:spPr/>
         <p:txBody>
-          <a:bodyPr/>
+          <a:bodyPr>
+            <a:normAutofit lnSpcReduction="10000"/>
+          </a:bodyPr>
           <a:lstStyle/>
           <a:p>
-            <a:endParaRPr lang="en-CA"/>
+            <a:r>
+              <a:rPr lang="en-US" dirty="0"/>
+              <a:t>The graphical user interface will allow the user to interact with 4-to-Connect</a:t>
+            </a:r>
+          </a:p>
+          <a:p>
+            <a:r>
+              <a:rPr lang="en-US" dirty="0"/>
+              <a:t>Will have primary use of </a:t>
+            </a:r>
+            <a:r>
+              <a:rPr lang="en-US" dirty="0" err="1"/>
+              <a:t>pygame</a:t>
+            </a:r>
+            <a:endParaRPr lang="en-US" dirty="0"/>
+          </a:p>
+          <a:p>
+            <a:pPr lvl="1"/>
+            <a:r>
+              <a:rPr lang="en-US" dirty="0"/>
+              <a:t>Objects</a:t>
+            </a:r>
+          </a:p>
+          <a:p>
+            <a:pPr lvl="2"/>
+            <a:r>
+              <a:rPr lang="en-US" dirty="0" err="1">
+                <a:latin typeface="Courier New" panose="02070309020205020404" pitchFamily="49" charset="0"/>
+                <a:cs typeface="Courier New" panose="02070309020205020404" pitchFamily="49" charset="0"/>
+              </a:rPr>
+              <a:t>pygame.Surface</a:t>
+            </a:r>
+            <a:endParaRPr lang="en-US" dirty="0">
+              <a:latin typeface="Courier New" panose="02070309020205020404" pitchFamily="49" charset="0"/>
+              <a:cs typeface="Courier New" panose="02070309020205020404" pitchFamily="49" charset="0"/>
+            </a:endParaRPr>
+          </a:p>
+          <a:p>
+            <a:pPr lvl="2"/>
+            <a:r>
+              <a:rPr lang="en-US" dirty="0" err="1">
+                <a:latin typeface="Courier New" panose="02070309020205020404" pitchFamily="49" charset="0"/>
+                <a:cs typeface="Courier New" panose="02070309020205020404" pitchFamily="49" charset="0"/>
+              </a:rPr>
+              <a:t>Pygame.Rect</a:t>
+            </a:r>
+            <a:endParaRPr lang="en-US" dirty="0">
+              <a:latin typeface="Courier New" panose="02070309020205020404" pitchFamily="49" charset="0"/>
+              <a:cs typeface="Courier New" panose="02070309020205020404" pitchFamily="49" charset="0"/>
+            </a:endParaRPr>
+          </a:p>
+          <a:p>
+            <a:pPr lvl="2"/>
+            <a:r>
+              <a:rPr lang="en-US" dirty="0" err="1">
+                <a:latin typeface="Courier New" panose="02070309020205020404" pitchFamily="49" charset="0"/>
+                <a:cs typeface="Courier New" panose="02070309020205020404" pitchFamily="49" charset="0"/>
+              </a:rPr>
+              <a:t>pygame.Color</a:t>
+            </a:r>
+            <a:endParaRPr lang="en-US" dirty="0">
+              <a:latin typeface="Courier New" panose="02070309020205020404" pitchFamily="49" charset="0"/>
+              <a:cs typeface="Courier New" panose="02070309020205020404" pitchFamily="49" charset="0"/>
+            </a:endParaRPr>
+          </a:p>
+          <a:p>
+            <a:pPr lvl="1"/>
+            <a:r>
+              <a:rPr lang="en-US" dirty="0">
+                <a:cs typeface="Courier New" panose="02070309020205020404" pitchFamily="49" charset="0"/>
+              </a:rPr>
+              <a:t>Modules</a:t>
+            </a:r>
+          </a:p>
+          <a:p>
+            <a:pPr lvl="2"/>
+            <a:r>
+              <a:rPr lang="en-US" dirty="0" err="1">
+                <a:latin typeface="Courier New" panose="02070309020205020404" pitchFamily="49" charset="0"/>
+                <a:cs typeface="Courier New" panose="02070309020205020404" pitchFamily="49" charset="0"/>
+              </a:rPr>
+              <a:t>pygame.mouse</a:t>
+            </a:r>
+            <a:endParaRPr lang="en-US" dirty="0">
+              <a:latin typeface="Courier New" panose="02070309020205020404" pitchFamily="49" charset="0"/>
+              <a:cs typeface="Courier New" panose="02070309020205020404" pitchFamily="49" charset="0"/>
+            </a:endParaRPr>
+          </a:p>
+          <a:p>
+            <a:pPr lvl="2"/>
+            <a:r>
+              <a:rPr lang="en-US" dirty="0" err="1">
+                <a:latin typeface="Courier New" panose="02070309020205020404" pitchFamily="49" charset="0"/>
+                <a:cs typeface="Courier New" panose="02070309020205020404" pitchFamily="49" charset="0"/>
+              </a:rPr>
+              <a:t>pygame.draw</a:t>
+            </a:r>
+            <a:endParaRPr lang="en-US" dirty="0">
+              <a:latin typeface="Courier New" panose="02070309020205020404" pitchFamily="49" charset="0"/>
+              <a:cs typeface="Courier New" panose="02070309020205020404" pitchFamily="49" charset="0"/>
+            </a:endParaRPr>
+          </a:p>
+          <a:p>
+            <a:pPr lvl="2"/>
+            <a:r>
+              <a:rPr lang="en-US" dirty="0" err="1">
+                <a:latin typeface="Courier New" panose="02070309020205020404" pitchFamily="49" charset="0"/>
+                <a:cs typeface="Courier New" panose="02070309020205020404" pitchFamily="49" charset="0"/>
+              </a:rPr>
+              <a:t>pygame.display</a:t>
+            </a:r>
+            <a:endParaRPr lang="en-US" dirty="0">
+              <a:latin typeface="Courier New" panose="02070309020205020404" pitchFamily="49" charset="0"/>
+              <a:cs typeface="Courier New" panose="02070309020205020404" pitchFamily="49" charset="0"/>
+            </a:endParaRPr>
+          </a:p>
+          <a:p>
+            <a:pPr lvl="2"/>
+            <a:r>
+              <a:rPr lang="en-US" dirty="0" err="1">
+                <a:latin typeface="Courier New" panose="02070309020205020404" pitchFamily="49" charset="0"/>
+                <a:cs typeface="Courier New" panose="02070309020205020404" pitchFamily="49" charset="0"/>
+              </a:rPr>
+              <a:t>pygame.event</a:t>
+            </a:r>
+            <a:endParaRPr lang="en-US" dirty="0">
+              <a:latin typeface="Courier New" panose="02070309020205020404" pitchFamily="49" charset="0"/>
+              <a:cs typeface="Courier New" panose="02070309020205020404" pitchFamily="49" charset="0"/>
+            </a:endParaRPr>
+          </a:p>
+          <a:p>
+            <a:endParaRPr lang="en-US" dirty="0"/>
+          </a:p>
+          <a:p>
+            <a:endParaRPr lang="en-CA" dirty="0"/>
           </a:p>
         </p:txBody>
       </p:sp>
@@ -8836,232 +11697,6 @@
     <p:extLst>
       <p:ext uri="{BB962C8B-B14F-4D97-AF65-F5344CB8AC3E}">
         <p14:creationId xmlns:p14="http://schemas.microsoft.com/office/powerpoint/2010/main" val="4082899656"/>
-      </p:ext>
-    </p:extLst>
-  </p:cSld>
-  <p:clrMapOvr>
-    <a:masterClrMapping/>
-  </p:clrMapOvr>
-</p:sld>
-</file>
-
-<file path=ppt/slides/slide8.xml><?xml version="1.0" encoding="utf-8"?>
-<p:sld xmlns:a="http://schemas.openxmlformats.org/drawingml/2006/main" xmlns:r="http://schemas.openxmlformats.org/officeDocument/2006/relationships" xmlns:p="http://schemas.openxmlformats.org/presentationml/2006/main">
-  <p:cSld>
-    <p:spTree>
-      <p:nvGrpSpPr>
-        <p:cNvPr id="1" name=""/>
-        <p:cNvGrpSpPr/>
-        <p:nvPr/>
-      </p:nvGrpSpPr>
-      <p:grpSpPr>
-        <a:xfrm>
-          <a:off x="0" y="0"/>
-          <a:ext cx="0" cy="0"/>
-          <a:chOff x="0" y="0"/>
-          <a:chExt cx="0" cy="0"/>
-        </a:xfrm>
-      </p:grpSpPr>
-      <p:sp>
-        <p:nvSpPr>
-          <p:cNvPr id="2" name="Title 1">
-            <a:extLst>
-              <a:ext uri="{FF2B5EF4-FFF2-40B4-BE49-F238E27FC236}">
-                <a16:creationId xmlns:a16="http://schemas.microsoft.com/office/drawing/2014/main" id="{0DD0F053-0211-4356-87B2-E9A0BC51074E}"/>
-              </a:ext>
-            </a:extLst>
-          </p:cNvPr>
-          <p:cNvSpPr>
-            <a:spLocks noGrp="1"/>
-          </p:cNvSpPr>
-          <p:nvPr>
-            <p:ph type="title"/>
-          </p:nvPr>
-        </p:nvSpPr>
-        <p:spPr/>
-        <p:txBody>
-          <a:bodyPr/>
-          <a:lstStyle/>
-          <a:p>
-            <a:r>
-              <a:rPr lang="en-US" dirty="0"/>
-              <a:t>GUI Components</a:t>
-            </a:r>
-            <a:endParaRPr lang="en-CA" dirty="0"/>
-          </a:p>
-        </p:txBody>
-      </p:sp>
-      <p:sp>
-        <p:nvSpPr>
-          <p:cNvPr id="3" name="Content Placeholder 2">
-            <a:extLst>
-              <a:ext uri="{FF2B5EF4-FFF2-40B4-BE49-F238E27FC236}">
-                <a16:creationId xmlns:a16="http://schemas.microsoft.com/office/drawing/2014/main" id="{AC5C79FF-5D92-42BB-A6F9-C4850BBDD67E}"/>
-              </a:ext>
-            </a:extLst>
-          </p:cNvPr>
-          <p:cNvSpPr>
-            <a:spLocks noGrp="1"/>
-          </p:cNvSpPr>
-          <p:nvPr>
-            <p:ph idx="1"/>
-          </p:nvPr>
-        </p:nvSpPr>
-        <p:spPr>
-          <a:xfrm>
-            <a:off x="838200" y="1406003"/>
-            <a:ext cx="10515600" cy="4863274"/>
-          </a:xfrm>
-        </p:spPr>
-        <p:txBody>
-          <a:bodyPr>
-            <a:normAutofit fontScale="77500" lnSpcReduction="20000"/>
-          </a:bodyPr>
-          <a:lstStyle/>
-          <a:p>
-            <a:r>
-              <a:rPr lang="en-US" dirty="0" err="1"/>
-              <a:t>Pygame</a:t>
-            </a:r>
-            <a:r>
-              <a:rPr lang="en-US" dirty="0"/>
-              <a:t> display surface represents the screen of the game.</a:t>
-            </a:r>
-          </a:p>
-          <a:p>
-            <a:r>
-              <a:rPr lang="en-US" dirty="0"/>
-              <a:t>Display Surface</a:t>
-            </a:r>
-          </a:p>
-          <a:p>
-            <a:pPr lvl="1"/>
-            <a:r>
-              <a:rPr lang="en-US" dirty="0"/>
-              <a:t>Display Surface Major Update 1 – Start View</a:t>
-            </a:r>
-          </a:p>
-          <a:p>
-            <a:pPr lvl="2"/>
-            <a:r>
-              <a:rPr lang="en-US" dirty="0"/>
-              <a:t>Start, Help and Exit Button</a:t>
-            </a:r>
-          </a:p>
-          <a:p>
-            <a:pPr lvl="2"/>
-            <a:r>
-              <a:rPr lang="en-US" dirty="0"/>
-              <a:t>Text Fields</a:t>
-            </a:r>
-          </a:p>
-          <a:p>
-            <a:pPr lvl="2"/>
-            <a:r>
-              <a:rPr lang="en-US" dirty="0"/>
-              <a:t>Few updates</a:t>
-            </a:r>
-          </a:p>
-          <a:p>
-            <a:pPr lvl="1"/>
-            <a:r>
-              <a:rPr lang="en-US" dirty="0"/>
-              <a:t>Display Surface Major Update 2 – Help View</a:t>
-            </a:r>
-          </a:p>
-          <a:p>
-            <a:pPr lvl="2"/>
-            <a:r>
-              <a:rPr lang="en-US" dirty="0"/>
-              <a:t>Start and Exit Button</a:t>
-            </a:r>
-          </a:p>
-          <a:p>
-            <a:pPr lvl="2"/>
-            <a:r>
-              <a:rPr lang="en-US" dirty="0"/>
-              <a:t>Text Fields</a:t>
-            </a:r>
-          </a:p>
-          <a:p>
-            <a:pPr lvl="2"/>
-            <a:r>
-              <a:rPr lang="en-US" dirty="0"/>
-              <a:t>Few updates</a:t>
-            </a:r>
-          </a:p>
-          <a:p>
-            <a:pPr lvl="1"/>
-            <a:r>
-              <a:rPr lang="en-US" dirty="0"/>
-              <a:t>Display Surface Major Update 3 – Play View</a:t>
-            </a:r>
-          </a:p>
-          <a:p>
-            <a:pPr lvl="2"/>
-            <a:r>
-              <a:rPr lang="en-US" dirty="0"/>
-              <a:t>Help and Exit Button</a:t>
-            </a:r>
-          </a:p>
-          <a:p>
-            <a:pPr lvl="2"/>
-            <a:r>
-              <a:rPr lang="en-US" dirty="0"/>
-              <a:t>Board</a:t>
-            </a:r>
-          </a:p>
-          <a:p>
-            <a:pPr lvl="2"/>
-            <a:r>
-              <a:rPr lang="en-US" dirty="0"/>
-              <a:t>Text Fields</a:t>
-            </a:r>
-          </a:p>
-          <a:p>
-            <a:pPr lvl="2"/>
-            <a:r>
-              <a:rPr lang="en-US" dirty="0"/>
-              <a:t>Multiple updates</a:t>
-            </a:r>
-          </a:p>
-          <a:p>
-            <a:pPr lvl="1"/>
-            <a:r>
-              <a:rPr lang="en-US" dirty="0"/>
-              <a:t>Display Surface Major Update 4 – End View</a:t>
-            </a:r>
-          </a:p>
-          <a:p>
-            <a:pPr lvl="2"/>
-            <a:r>
-              <a:rPr lang="en-US" dirty="0"/>
-              <a:t>Play Again and Help Button</a:t>
-            </a:r>
-          </a:p>
-          <a:p>
-            <a:pPr lvl="2"/>
-            <a:r>
-              <a:rPr lang="en-US" dirty="0"/>
-              <a:t>Text Fields</a:t>
-            </a:r>
-          </a:p>
-          <a:p>
-            <a:pPr lvl="2"/>
-            <a:r>
-              <a:rPr lang="en-US" dirty="0"/>
-              <a:t>Few updates</a:t>
-            </a:r>
-          </a:p>
-          <a:p>
-            <a:endParaRPr lang="en-CA" dirty="0"/>
-          </a:p>
-        </p:txBody>
-      </p:sp>
-    </p:spTree>
-    <p:extLst>
-      <p:ext uri="{BB962C8B-B14F-4D97-AF65-F5344CB8AC3E}">
-        <p14:creationId xmlns:p14="http://schemas.microsoft.com/office/powerpoint/2010/main" val="335759700"/>
       </p:ext>
     </p:extLst>
   </p:cSld>

</xml_diff>